<commit_message>
Second draft of the Experts Ontology: added Expert Subjective/Objective Properties and *Detail properties, modified modeling accordingly, added relationship from Expertise to Sign.
</commit_message>
<xml_diff>
--- a/Experts Ontology.pptx
+++ b/Experts Ontology.pptx
@@ -6,6 +6,7 @@
   </p:sldMasterIdLst>
   <p:sldIdLst>
     <p:sldId id="258" r:id="rId2"/>
+    <p:sldId id="259" r:id="rId3"/>
   </p:sldIdLst>
   <p:sldSz cx="9144000" cy="6858000" type="screen4x3"/>
   <p:notesSz cx="6858000" cy="9144000"/>
@@ -288,7 +289,7 @@
           <a:p>
             <a:fld id="{48C9F1CD-E649-46E6-8179-CAF23F06D0E2}" type="datetimeFigureOut">
               <a:rPr lang="it-IT" smtClean="0"/>
-              <a:t>07/05/2020</a:t>
+              <a:t>05/06/2020</a:t>
             </a:fld>
             <a:endParaRPr lang="it-IT"/>
           </a:p>
@@ -458,7 +459,7 @@
           <a:p>
             <a:fld id="{48C9F1CD-E649-46E6-8179-CAF23F06D0E2}" type="datetimeFigureOut">
               <a:rPr lang="it-IT" smtClean="0"/>
-              <a:t>07/05/2020</a:t>
+              <a:t>05/06/2020</a:t>
             </a:fld>
             <a:endParaRPr lang="it-IT"/>
           </a:p>
@@ -638,7 +639,7 @@
           <a:p>
             <a:fld id="{48C9F1CD-E649-46E6-8179-CAF23F06D0E2}" type="datetimeFigureOut">
               <a:rPr lang="it-IT" smtClean="0"/>
-              <a:t>07/05/2020</a:t>
+              <a:t>05/06/2020</a:t>
             </a:fld>
             <a:endParaRPr lang="it-IT"/>
           </a:p>
@@ -808,7 +809,7 @@
           <a:p>
             <a:fld id="{48C9F1CD-E649-46E6-8179-CAF23F06D0E2}" type="datetimeFigureOut">
               <a:rPr lang="it-IT" smtClean="0"/>
-              <a:t>07/05/2020</a:t>
+              <a:t>05/06/2020</a:t>
             </a:fld>
             <a:endParaRPr lang="it-IT"/>
           </a:p>
@@ -1054,7 +1055,7 @@
           <a:p>
             <a:fld id="{48C9F1CD-E649-46E6-8179-CAF23F06D0E2}" type="datetimeFigureOut">
               <a:rPr lang="it-IT" smtClean="0"/>
-              <a:t>07/05/2020</a:t>
+              <a:t>05/06/2020</a:t>
             </a:fld>
             <a:endParaRPr lang="it-IT"/>
           </a:p>
@@ -1342,7 +1343,7 @@
           <a:p>
             <a:fld id="{48C9F1CD-E649-46E6-8179-CAF23F06D0E2}" type="datetimeFigureOut">
               <a:rPr lang="it-IT" smtClean="0"/>
-              <a:t>07/05/2020</a:t>
+              <a:t>05/06/2020</a:t>
             </a:fld>
             <a:endParaRPr lang="it-IT"/>
           </a:p>
@@ -1764,7 +1765,7 @@
           <a:p>
             <a:fld id="{48C9F1CD-E649-46E6-8179-CAF23F06D0E2}" type="datetimeFigureOut">
               <a:rPr lang="it-IT" smtClean="0"/>
-              <a:t>07/05/2020</a:t>
+              <a:t>05/06/2020</a:t>
             </a:fld>
             <a:endParaRPr lang="it-IT"/>
           </a:p>
@@ -1882,7 +1883,7 @@
           <a:p>
             <a:fld id="{48C9F1CD-E649-46E6-8179-CAF23F06D0E2}" type="datetimeFigureOut">
               <a:rPr lang="it-IT" smtClean="0"/>
-              <a:t>07/05/2020</a:t>
+              <a:t>05/06/2020</a:t>
             </a:fld>
             <a:endParaRPr lang="it-IT"/>
           </a:p>
@@ -1977,7 +1978,7 @@
           <a:p>
             <a:fld id="{48C9F1CD-E649-46E6-8179-CAF23F06D0E2}" type="datetimeFigureOut">
               <a:rPr lang="it-IT" smtClean="0"/>
-              <a:t>07/05/2020</a:t>
+              <a:t>05/06/2020</a:t>
             </a:fld>
             <a:endParaRPr lang="it-IT"/>
           </a:p>
@@ -2254,7 +2255,7 @@
           <a:p>
             <a:fld id="{48C9F1CD-E649-46E6-8179-CAF23F06D0E2}" type="datetimeFigureOut">
               <a:rPr lang="it-IT" smtClean="0"/>
-              <a:t>07/05/2020</a:t>
+              <a:t>05/06/2020</a:t>
             </a:fld>
             <a:endParaRPr lang="it-IT"/>
           </a:p>
@@ -2507,7 +2508,7 @@
           <a:p>
             <a:fld id="{48C9F1CD-E649-46E6-8179-CAF23F06D0E2}" type="datetimeFigureOut">
               <a:rPr lang="it-IT" smtClean="0"/>
-              <a:t>07/05/2020</a:t>
+              <a:t>05/06/2020</a:t>
             </a:fld>
             <a:endParaRPr lang="it-IT"/>
           </a:p>
@@ -2720,7 +2721,7 @@
           <a:p>
             <a:fld id="{48C9F1CD-E649-46E6-8179-CAF23F06D0E2}" type="datetimeFigureOut">
               <a:rPr lang="it-IT" smtClean="0"/>
-              <a:t>07/05/2020</a:t>
+              <a:t>05/06/2020</a:t>
             </a:fld>
             <a:endParaRPr lang="it-IT"/>
           </a:p>
@@ -6082,11 +6083,7 @@
           <a:p>
             <a:r>
               <a:rPr lang="it-IT" sz="1200" dirty="0" err="1" smtClean="0"/>
-              <a:t>contractT</a:t>
-            </a:r>
-            <a:r>
-              <a:rPr lang="it-IT" sz="1200" dirty="0" err="1" smtClean="0"/>
-              <a:t>ype</a:t>
+              <a:t>contractType</a:t>
             </a:r>
             <a:endParaRPr lang="it-IT" sz="1200" dirty="0" smtClean="0"/>
           </a:p>
@@ -6212,11 +6209,7 @@
           <a:p>
             <a:r>
               <a:rPr lang="it-IT" sz="1200" dirty="0" err="1" smtClean="0"/>
-              <a:t>contractC</a:t>
-            </a:r>
-            <a:r>
-              <a:rPr lang="it-IT" sz="1200" dirty="0" err="1" smtClean="0"/>
-              <a:t>onstraint</a:t>
+              <a:t>contractConstraint</a:t>
             </a:r>
             <a:endParaRPr lang="it-IT" sz="1200" dirty="0" smtClean="0"/>
           </a:p>
@@ -6724,7 +6717,6 @@
               <a:rPr lang="it-IT" sz="1200" dirty="0" smtClean="0"/>
               <a:t>…</a:t>
             </a:r>
-            <a:endParaRPr lang="it-IT" sz="1200" dirty="0" smtClean="0"/>
           </a:p>
         </p:txBody>
       </p:sp>
@@ -6846,6 +6838,4572 @@
   <p:clrMapOvr>
     <a:masterClrMapping/>
   </p:clrMapOvr>
+</p:sld>
+</file>
+
+<file path=ppt/slides/slide2.xml><?xml version="1.0" encoding="utf-8"?>
+<p:sld xmlns:a="http://schemas.openxmlformats.org/drawingml/2006/main" xmlns:r="http://schemas.openxmlformats.org/officeDocument/2006/relationships" xmlns:p="http://schemas.openxmlformats.org/presentationml/2006/main">
+  <p:cSld>
+    <p:spTree>
+      <p:nvGrpSpPr>
+        <p:cNvPr id="1" name=""/>
+        <p:cNvGrpSpPr/>
+        <p:nvPr/>
+      </p:nvGrpSpPr>
+      <p:grpSpPr>
+        <a:xfrm>
+          <a:off x="0" y="0"/>
+          <a:ext cx="0" cy="0"/>
+          <a:chOff x="0" y="0"/>
+          <a:chExt cx="0" cy="0"/>
+        </a:xfrm>
+      </p:grpSpPr>
+      <p:sp>
+        <p:nvSpPr>
+          <p:cNvPr id="99" name="Rounded Rectangle 98"/>
+          <p:cNvSpPr/>
+          <p:nvPr/>
+        </p:nvSpPr>
+        <p:spPr>
+          <a:xfrm>
+            <a:off x="281466" y="1306118"/>
+            <a:ext cx="1440160" cy="394690"/>
+          </a:xfrm>
+          <a:prstGeom prst="roundRect">
+            <a:avLst/>
+          </a:prstGeom>
+        </p:spPr>
+        <p:style>
+          <a:lnRef idx="3">
+            <a:schemeClr val="lt1"/>
+          </a:lnRef>
+          <a:fillRef idx="1">
+            <a:schemeClr val="accent3"/>
+          </a:fillRef>
+          <a:effectRef idx="1">
+            <a:schemeClr val="accent3"/>
+          </a:effectRef>
+          <a:fontRef idx="minor">
+            <a:schemeClr val="lt1"/>
+          </a:fontRef>
+        </p:style>
+        <p:txBody>
+          <a:bodyPr rtlCol="0" anchor="ctr"/>
+          <a:lstStyle/>
+          <a:p>
+            <a:pPr algn="ctr"/>
+            <a:r>
+              <a:rPr lang="it-IT" dirty="0" smtClean="0"/>
+              <a:t>Expert</a:t>
+            </a:r>
+            <a:endParaRPr lang="it-IT" dirty="0"/>
+          </a:p>
+        </p:txBody>
+      </p:sp>
+      <p:cxnSp>
+        <p:nvCxnSpPr>
+          <p:cNvPr id="102" name="Straight Arrow Connector 101"/>
+          <p:cNvCxnSpPr>
+            <a:stCxn id="99" idx="0"/>
+            <a:endCxn id="12" idx="2"/>
+          </p:cNvCxnSpPr>
+          <p:nvPr/>
+        </p:nvCxnSpPr>
+        <p:spPr>
+          <a:xfrm flipV="1">
+            <a:off x="1001546" y="889256"/>
+            <a:ext cx="0" cy="416862"/>
+          </a:xfrm>
+          <a:prstGeom prst="straightConnector1">
+            <a:avLst/>
+          </a:prstGeom>
+          <a:ln>
+            <a:tailEnd type="arrow"/>
+          </a:ln>
+        </p:spPr>
+        <p:style>
+          <a:lnRef idx="2">
+            <a:schemeClr val="accent1"/>
+          </a:lnRef>
+          <a:fillRef idx="0">
+            <a:schemeClr val="accent1"/>
+          </a:fillRef>
+          <a:effectRef idx="1">
+            <a:schemeClr val="accent1"/>
+          </a:effectRef>
+          <a:fontRef idx="minor">
+            <a:schemeClr val="tx1"/>
+          </a:fontRef>
+        </p:style>
+      </p:cxnSp>
+      <p:sp>
+        <p:nvSpPr>
+          <p:cNvPr id="103" name="TextBox 102"/>
+          <p:cNvSpPr txBox="1"/>
+          <p:nvPr/>
+        </p:nvSpPr>
+        <p:spPr>
+          <a:xfrm>
+            <a:off x="360818" y="991761"/>
+            <a:ext cx="1360808" cy="276999"/>
+          </a:xfrm>
+          <a:prstGeom prst="rect">
+            <a:avLst/>
+          </a:prstGeom>
+          <a:noFill/>
+        </p:spPr>
+        <p:txBody>
+          <a:bodyPr wrap="square" rtlCol="0">
+            <a:spAutoFit/>
+          </a:bodyPr>
+          <a:lstStyle/>
+          <a:p>
+            <a:r>
+              <a:rPr lang="it-IT" sz="1200" dirty="0" err="1" smtClean="0">
+                <a:solidFill>
+                  <a:srgbClr val="0070C0"/>
+                </a:solidFill>
+              </a:rPr>
+              <a:t>rdfs:subClassOf</a:t>
+            </a:r>
+            <a:endParaRPr lang="it-IT" sz="1200" dirty="0">
+              <a:solidFill>
+                <a:srgbClr val="0070C0"/>
+              </a:solidFill>
+            </a:endParaRPr>
+          </a:p>
+        </p:txBody>
+      </p:sp>
+      <p:sp>
+        <p:nvSpPr>
+          <p:cNvPr id="104" name="Rounded Rectangle 103"/>
+          <p:cNvSpPr/>
+          <p:nvPr/>
+        </p:nvSpPr>
+        <p:spPr>
+          <a:xfrm>
+            <a:off x="2809091" y="1553603"/>
+            <a:ext cx="1440160" cy="394690"/>
+          </a:xfrm>
+          <a:prstGeom prst="roundRect">
+            <a:avLst/>
+          </a:prstGeom>
+        </p:spPr>
+        <p:style>
+          <a:lnRef idx="3">
+            <a:schemeClr val="lt1"/>
+          </a:lnRef>
+          <a:fillRef idx="1">
+            <a:schemeClr val="accent3"/>
+          </a:fillRef>
+          <a:effectRef idx="1">
+            <a:schemeClr val="accent3"/>
+          </a:effectRef>
+          <a:fontRef idx="minor">
+            <a:schemeClr val="lt1"/>
+          </a:fontRef>
+        </p:style>
+        <p:txBody>
+          <a:bodyPr rtlCol="0" anchor="ctr"/>
+          <a:lstStyle/>
+          <a:p>
+            <a:pPr algn="ctr"/>
+            <a:r>
+              <a:rPr lang="it-IT" dirty="0" smtClean="0"/>
+              <a:t>Expertise</a:t>
+            </a:r>
+            <a:endParaRPr lang="it-IT" dirty="0"/>
+          </a:p>
+        </p:txBody>
+      </p:sp>
+      <p:cxnSp>
+        <p:nvCxnSpPr>
+          <p:cNvPr id="106" name="Straight Arrow Connector 105"/>
+          <p:cNvCxnSpPr>
+            <a:stCxn id="99" idx="3"/>
+            <a:endCxn id="104" idx="1"/>
+          </p:cNvCxnSpPr>
+          <p:nvPr/>
+        </p:nvCxnSpPr>
+        <p:spPr>
+          <a:xfrm>
+            <a:off x="1721626" y="1503463"/>
+            <a:ext cx="1087465" cy="247485"/>
+          </a:xfrm>
+          <a:prstGeom prst="straightConnector1">
+            <a:avLst/>
+          </a:prstGeom>
+          <a:ln>
+            <a:tailEnd type="arrow"/>
+          </a:ln>
+        </p:spPr>
+        <p:style>
+          <a:lnRef idx="2">
+            <a:schemeClr val="dk1"/>
+          </a:lnRef>
+          <a:fillRef idx="0">
+            <a:schemeClr val="dk1"/>
+          </a:fillRef>
+          <a:effectRef idx="1">
+            <a:schemeClr val="dk1"/>
+          </a:effectRef>
+          <a:fontRef idx="minor">
+            <a:schemeClr val="tx1"/>
+          </a:fontRef>
+        </p:style>
+      </p:cxnSp>
+      <p:sp>
+        <p:nvSpPr>
+          <p:cNvPr id="109" name="TextBox 108"/>
+          <p:cNvSpPr txBox="1"/>
+          <p:nvPr/>
+        </p:nvSpPr>
+        <p:spPr>
+          <a:xfrm>
+            <a:off x="1728970" y="1207785"/>
+            <a:ext cx="1241784" cy="276999"/>
+          </a:xfrm>
+          <a:prstGeom prst="rect">
+            <a:avLst/>
+          </a:prstGeom>
+          <a:noFill/>
+        </p:spPr>
+        <p:txBody>
+          <a:bodyPr wrap="square" rtlCol="0">
+            <a:spAutoFit/>
+          </a:bodyPr>
+          <a:lstStyle/>
+          <a:p>
+            <a:r>
+              <a:rPr lang="it-IT" sz="1200" dirty="0" err="1" smtClean="0"/>
+              <a:t>hasExpertise</a:t>
+            </a:r>
+            <a:endParaRPr lang="it-IT" sz="1200" dirty="0"/>
+          </a:p>
+        </p:txBody>
+      </p:sp>
+      <p:cxnSp>
+        <p:nvCxnSpPr>
+          <p:cNvPr id="110" name="Straight Arrow Connector 109"/>
+          <p:cNvCxnSpPr>
+            <a:stCxn id="180" idx="0"/>
+            <a:endCxn id="10" idx="1"/>
+          </p:cNvCxnSpPr>
+          <p:nvPr/>
+        </p:nvCxnSpPr>
+        <p:spPr>
+          <a:xfrm flipV="1">
+            <a:off x="3582814" y="288032"/>
+            <a:ext cx="927249" cy="188640"/>
+          </a:xfrm>
+          <a:prstGeom prst="straightConnector1">
+            <a:avLst/>
+          </a:prstGeom>
+          <a:ln>
+            <a:tailEnd type="arrow"/>
+          </a:ln>
+        </p:spPr>
+        <p:style>
+          <a:lnRef idx="2">
+            <a:schemeClr val="accent1"/>
+          </a:lnRef>
+          <a:fillRef idx="0">
+            <a:schemeClr val="accent1"/>
+          </a:fillRef>
+          <a:effectRef idx="1">
+            <a:schemeClr val="accent1"/>
+          </a:effectRef>
+          <a:fontRef idx="minor">
+            <a:schemeClr val="tx1"/>
+          </a:fontRef>
+        </p:style>
+      </p:cxnSp>
+      <p:sp>
+        <p:nvSpPr>
+          <p:cNvPr id="111" name="TextBox 110"/>
+          <p:cNvSpPr txBox="1"/>
+          <p:nvPr/>
+        </p:nvSpPr>
+        <p:spPr>
+          <a:xfrm>
+            <a:off x="3313146" y="188640"/>
+            <a:ext cx="1152128" cy="276999"/>
+          </a:xfrm>
+          <a:prstGeom prst="rect">
+            <a:avLst/>
+          </a:prstGeom>
+          <a:noFill/>
+        </p:spPr>
+        <p:txBody>
+          <a:bodyPr wrap="square" rtlCol="0">
+            <a:spAutoFit/>
+          </a:bodyPr>
+          <a:lstStyle/>
+          <a:p>
+            <a:r>
+              <a:rPr lang="it-IT" sz="1200" dirty="0" err="1" smtClean="0">
+                <a:solidFill>
+                  <a:srgbClr val="0070C0"/>
+                </a:solidFill>
+              </a:rPr>
+              <a:t>rdfs:subClassOf</a:t>
+            </a:r>
+            <a:endParaRPr lang="it-IT" sz="1200" dirty="0">
+              <a:solidFill>
+                <a:srgbClr val="0070C0"/>
+              </a:solidFill>
+            </a:endParaRPr>
+          </a:p>
+        </p:txBody>
+      </p:sp>
+      <p:sp>
+        <p:nvSpPr>
+          <p:cNvPr id="10" name="Rounded Rectangle 9"/>
+          <p:cNvSpPr/>
+          <p:nvPr/>
+        </p:nvSpPr>
+        <p:spPr>
+          <a:xfrm>
+            <a:off x="4510063" y="16450"/>
+            <a:ext cx="1284900" cy="543163"/>
+          </a:xfrm>
+          <a:prstGeom prst="roundRect">
+            <a:avLst/>
+          </a:prstGeom>
+        </p:spPr>
+        <p:style>
+          <a:lnRef idx="2">
+            <a:schemeClr val="accent6">
+              <a:shade val="50000"/>
+            </a:schemeClr>
+          </a:lnRef>
+          <a:fillRef idx="1">
+            <a:schemeClr val="accent6"/>
+          </a:fillRef>
+          <a:effectRef idx="0">
+            <a:schemeClr val="accent6"/>
+          </a:effectRef>
+          <a:fontRef idx="minor">
+            <a:schemeClr val="lt1"/>
+          </a:fontRef>
+        </p:style>
+        <p:txBody>
+          <a:bodyPr rtlCol="0" anchor="ctr"/>
+          <a:lstStyle/>
+          <a:p>
+            <a:pPr algn="ctr"/>
+            <a:r>
+              <a:rPr lang="it-IT" dirty="0" err="1" smtClean="0"/>
+              <a:t>SubjectiveProperty</a:t>
+            </a:r>
+            <a:endParaRPr lang="it-IT" dirty="0"/>
+          </a:p>
+        </p:txBody>
+      </p:sp>
+      <p:sp>
+        <p:nvSpPr>
+          <p:cNvPr id="12" name="Rounded Rectangle 11"/>
+          <p:cNvSpPr/>
+          <p:nvPr/>
+        </p:nvSpPr>
+        <p:spPr>
+          <a:xfrm>
+            <a:off x="443484" y="404664"/>
+            <a:ext cx="1116124" cy="484592"/>
+          </a:xfrm>
+          <a:prstGeom prst="roundRect">
+            <a:avLst/>
+          </a:prstGeom>
+        </p:spPr>
+        <p:style>
+          <a:lnRef idx="2">
+            <a:schemeClr val="accent2">
+              <a:shade val="50000"/>
+            </a:schemeClr>
+          </a:lnRef>
+          <a:fillRef idx="1">
+            <a:schemeClr val="accent2"/>
+          </a:fillRef>
+          <a:effectRef idx="0">
+            <a:schemeClr val="accent2"/>
+          </a:effectRef>
+          <a:fontRef idx="minor">
+            <a:schemeClr val="lt1"/>
+          </a:fontRef>
+        </p:style>
+        <p:txBody>
+          <a:bodyPr rtlCol="0" anchor="ctr"/>
+          <a:lstStyle/>
+          <a:p>
+            <a:pPr algn="ctr"/>
+            <a:r>
+              <a:rPr lang="it-IT" dirty="0" err="1" smtClean="0"/>
+              <a:t>Physical</a:t>
+            </a:r>
+            <a:endParaRPr lang="it-IT" dirty="0" smtClean="0"/>
+          </a:p>
+        </p:txBody>
+      </p:sp>
+      <p:sp>
+        <p:nvSpPr>
+          <p:cNvPr id="34" name="Rounded Rectangle 33"/>
+          <p:cNvSpPr/>
+          <p:nvPr/>
+        </p:nvSpPr>
+        <p:spPr>
+          <a:xfrm>
+            <a:off x="2809090" y="2242222"/>
+            <a:ext cx="1440160" cy="394690"/>
+          </a:xfrm>
+          <a:prstGeom prst="roundRect">
+            <a:avLst/>
+          </a:prstGeom>
+        </p:spPr>
+        <p:style>
+          <a:lnRef idx="3">
+            <a:schemeClr val="lt1"/>
+          </a:lnRef>
+          <a:fillRef idx="1">
+            <a:schemeClr val="accent3"/>
+          </a:fillRef>
+          <a:effectRef idx="1">
+            <a:schemeClr val="accent3"/>
+          </a:effectRef>
+          <a:fontRef idx="minor">
+            <a:schemeClr val="lt1"/>
+          </a:fontRef>
+        </p:style>
+        <p:txBody>
+          <a:bodyPr rtlCol="0" anchor="ctr"/>
+          <a:lstStyle/>
+          <a:p>
+            <a:pPr algn="ctr"/>
+            <a:r>
+              <a:rPr lang="it-IT" dirty="0" smtClean="0"/>
+              <a:t>Organization</a:t>
+            </a:r>
+            <a:endParaRPr lang="it-IT" dirty="0"/>
+          </a:p>
+        </p:txBody>
+      </p:sp>
+      <p:sp>
+        <p:nvSpPr>
+          <p:cNvPr id="35" name="Rounded Rectangle 34"/>
+          <p:cNvSpPr/>
+          <p:nvPr/>
+        </p:nvSpPr>
+        <p:spPr>
+          <a:xfrm>
+            <a:off x="2806074" y="2780928"/>
+            <a:ext cx="1440160" cy="394690"/>
+          </a:xfrm>
+          <a:prstGeom prst="roundRect">
+            <a:avLst/>
+          </a:prstGeom>
+        </p:spPr>
+        <p:style>
+          <a:lnRef idx="3">
+            <a:schemeClr val="lt1"/>
+          </a:lnRef>
+          <a:fillRef idx="1">
+            <a:schemeClr val="accent3"/>
+          </a:fillRef>
+          <a:effectRef idx="1">
+            <a:schemeClr val="accent3"/>
+          </a:effectRef>
+          <a:fontRef idx="minor">
+            <a:schemeClr val="lt1"/>
+          </a:fontRef>
+        </p:style>
+        <p:txBody>
+          <a:bodyPr rtlCol="0" anchor="ctr"/>
+          <a:lstStyle/>
+          <a:p>
+            <a:pPr algn="ctr"/>
+            <a:r>
+              <a:rPr lang="it-IT" dirty="0" smtClean="0"/>
+              <a:t>Language</a:t>
+            </a:r>
+            <a:endParaRPr lang="it-IT" dirty="0"/>
+          </a:p>
+        </p:txBody>
+      </p:sp>
+      <p:sp>
+        <p:nvSpPr>
+          <p:cNvPr id="36" name="Rounded Rectangle 35"/>
+          <p:cNvSpPr/>
+          <p:nvPr/>
+        </p:nvSpPr>
+        <p:spPr>
+          <a:xfrm>
+            <a:off x="2806074" y="3356992"/>
+            <a:ext cx="1440160" cy="394690"/>
+          </a:xfrm>
+          <a:prstGeom prst="roundRect">
+            <a:avLst/>
+          </a:prstGeom>
+        </p:spPr>
+        <p:style>
+          <a:lnRef idx="3">
+            <a:schemeClr val="lt1"/>
+          </a:lnRef>
+          <a:fillRef idx="1">
+            <a:schemeClr val="accent3"/>
+          </a:fillRef>
+          <a:effectRef idx="1">
+            <a:schemeClr val="accent3"/>
+          </a:effectRef>
+          <a:fontRef idx="minor">
+            <a:schemeClr val="lt1"/>
+          </a:fontRef>
+        </p:style>
+        <p:txBody>
+          <a:bodyPr rtlCol="0" anchor="ctr"/>
+          <a:lstStyle/>
+          <a:p>
+            <a:pPr algn="ctr"/>
+            <a:r>
+              <a:rPr lang="it-IT" dirty="0" err="1" smtClean="0"/>
+              <a:t>DailyRate</a:t>
+            </a:r>
+            <a:endParaRPr lang="it-IT" dirty="0"/>
+          </a:p>
+        </p:txBody>
+      </p:sp>
+      <p:sp>
+        <p:nvSpPr>
+          <p:cNvPr id="37" name="Rounded Rectangle 36"/>
+          <p:cNvSpPr/>
+          <p:nvPr/>
+        </p:nvSpPr>
+        <p:spPr>
+          <a:xfrm>
+            <a:off x="2809090" y="3933056"/>
+            <a:ext cx="1440160" cy="394690"/>
+          </a:xfrm>
+          <a:prstGeom prst="roundRect">
+            <a:avLst/>
+          </a:prstGeom>
+        </p:spPr>
+        <p:style>
+          <a:lnRef idx="3">
+            <a:schemeClr val="lt1"/>
+          </a:lnRef>
+          <a:fillRef idx="1">
+            <a:schemeClr val="accent3"/>
+          </a:fillRef>
+          <a:effectRef idx="1">
+            <a:schemeClr val="accent3"/>
+          </a:effectRef>
+          <a:fontRef idx="minor">
+            <a:schemeClr val="lt1"/>
+          </a:fontRef>
+        </p:style>
+        <p:txBody>
+          <a:bodyPr rtlCol="0" anchor="ctr"/>
+          <a:lstStyle/>
+          <a:p>
+            <a:pPr algn="ctr"/>
+            <a:r>
+              <a:rPr lang="it-IT" dirty="0" err="1" smtClean="0"/>
+              <a:t>Certification</a:t>
+            </a:r>
+            <a:endParaRPr lang="it-IT" dirty="0"/>
+          </a:p>
+        </p:txBody>
+      </p:sp>
+      <p:sp>
+        <p:nvSpPr>
+          <p:cNvPr id="38" name="Rounded Rectangle 37"/>
+          <p:cNvSpPr/>
+          <p:nvPr/>
+        </p:nvSpPr>
+        <p:spPr>
+          <a:xfrm>
+            <a:off x="2808590" y="4509120"/>
+            <a:ext cx="1875224" cy="394690"/>
+          </a:xfrm>
+          <a:prstGeom prst="roundRect">
+            <a:avLst/>
+          </a:prstGeom>
+        </p:spPr>
+        <p:style>
+          <a:lnRef idx="3">
+            <a:schemeClr val="lt1"/>
+          </a:lnRef>
+          <a:fillRef idx="1">
+            <a:schemeClr val="accent3"/>
+          </a:fillRef>
+          <a:effectRef idx="1">
+            <a:schemeClr val="accent3"/>
+          </a:effectRef>
+          <a:fontRef idx="minor">
+            <a:schemeClr val="lt1"/>
+          </a:fontRef>
+        </p:style>
+        <p:txBody>
+          <a:bodyPr rtlCol="0" anchor="ctr"/>
+          <a:lstStyle/>
+          <a:p>
+            <a:pPr algn="ctr"/>
+            <a:r>
+              <a:rPr lang="it-IT" dirty="0" err="1" smtClean="0"/>
+              <a:t>ExternalProfile</a:t>
+            </a:r>
+            <a:endParaRPr lang="it-IT" dirty="0"/>
+          </a:p>
+        </p:txBody>
+      </p:sp>
+      <p:sp>
+        <p:nvSpPr>
+          <p:cNvPr id="42" name="Rounded Rectangle 41"/>
+          <p:cNvSpPr/>
+          <p:nvPr/>
+        </p:nvSpPr>
+        <p:spPr>
+          <a:xfrm>
+            <a:off x="5401378" y="2265687"/>
+            <a:ext cx="1440160" cy="394690"/>
+          </a:xfrm>
+          <a:prstGeom prst="roundRect">
+            <a:avLst/>
+          </a:prstGeom>
+        </p:spPr>
+        <p:style>
+          <a:lnRef idx="3">
+            <a:schemeClr val="lt1"/>
+          </a:lnRef>
+          <a:fillRef idx="1">
+            <a:schemeClr val="accent3"/>
+          </a:fillRef>
+          <a:effectRef idx="1">
+            <a:schemeClr val="accent3"/>
+          </a:effectRef>
+          <a:fontRef idx="minor">
+            <a:schemeClr val="lt1"/>
+          </a:fontRef>
+        </p:style>
+        <p:txBody>
+          <a:bodyPr rtlCol="0" anchor="ctr"/>
+          <a:lstStyle/>
+          <a:p>
+            <a:pPr algn="ctr"/>
+            <a:r>
+              <a:rPr lang="it-IT" dirty="0" smtClean="0"/>
+              <a:t>Location</a:t>
+            </a:r>
+            <a:endParaRPr lang="it-IT" dirty="0"/>
+          </a:p>
+        </p:txBody>
+      </p:sp>
+      <p:cxnSp>
+        <p:nvCxnSpPr>
+          <p:cNvPr id="43" name="Straight Arrow Connector 42"/>
+          <p:cNvCxnSpPr>
+            <a:stCxn id="34" idx="3"/>
+            <a:endCxn id="42" idx="1"/>
+          </p:cNvCxnSpPr>
+          <p:nvPr/>
+        </p:nvCxnSpPr>
+        <p:spPr>
+          <a:xfrm>
+            <a:off x="4249250" y="2439567"/>
+            <a:ext cx="1152128" cy="23465"/>
+          </a:xfrm>
+          <a:prstGeom prst="straightConnector1">
+            <a:avLst/>
+          </a:prstGeom>
+          <a:ln>
+            <a:tailEnd type="arrow"/>
+          </a:ln>
+        </p:spPr>
+        <p:style>
+          <a:lnRef idx="2">
+            <a:schemeClr val="dk1"/>
+          </a:lnRef>
+          <a:fillRef idx="0">
+            <a:schemeClr val="dk1"/>
+          </a:fillRef>
+          <a:effectRef idx="1">
+            <a:schemeClr val="dk1"/>
+          </a:effectRef>
+          <a:fontRef idx="minor">
+            <a:schemeClr val="tx1"/>
+          </a:fontRef>
+        </p:style>
+      </p:cxnSp>
+      <p:sp>
+        <p:nvSpPr>
+          <p:cNvPr id="44" name="TextBox 43"/>
+          <p:cNvSpPr txBox="1"/>
+          <p:nvPr/>
+        </p:nvSpPr>
+        <p:spPr>
+          <a:xfrm>
+            <a:off x="4321258" y="2143889"/>
+            <a:ext cx="1241784" cy="276999"/>
+          </a:xfrm>
+          <a:prstGeom prst="rect">
+            <a:avLst/>
+          </a:prstGeom>
+          <a:noFill/>
+        </p:spPr>
+        <p:txBody>
+          <a:bodyPr wrap="square" rtlCol="0">
+            <a:spAutoFit/>
+          </a:bodyPr>
+          <a:lstStyle/>
+          <a:p>
+            <a:r>
+              <a:rPr lang="it-IT" sz="1200" dirty="0" err="1" smtClean="0"/>
+              <a:t>isLocatedAt</a:t>
+            </a:r>
+            <a:endParaRPr lang="it-IT" sz="1200" dirty="0"/>
+          </a:p>
+        </p:txBody>
+      </p:sp>
+      <p:cxnSp>
+        <p:nvCxnSpPr>
+          <p:cNvPr id="47" name="Straight Arrow Connector 46"/>
+          <p:cNvCxnSpPr>
+            <a:stCxn id="35" idx="3"/>
+            <a:endCxn id="127" idx="1"/>
+          </p:cNvCxnSpPr>
+          <p:nvPr/>
+        </p:nvCxnSpPr>
+        <p:spPr>
+          <a:xfrm>
+            <a:off x="4246234" y="2978273"/>
+            <a:ext cx="1371168" cy="301195"/>
+          </a:xfrm>
+          <a:prstGeom prst="straightConnector1">
+            <a:avLst/>
+          </a:prstGeom>
+          <a:ln>
+            <a:tailEnd type="arrow"/>
+          </a:ln>
+        </p:spPr>
+        <p:style>
+          <a:lnRef idx="2">
+            <a:schemeClr val="dk1"/>
+          </a:lnRef>
+          <a:fillRef idx="0">
+            <a:schemeClr val="dk1"/>
+          </a:fillRef>
+          <a:effectRef idx="1">
+            <a:schemeClr val="dk1"/>
+          </a:effectRef>
+          <a:fontRef idx="minor">
+            <a:schemeClr val="tx1"/>
+          </a:fontRef>
+        </p:style>
+      </p:cxnSp>
+      <p:sp>
+        <p:nvSpPr>
+          <p:cNvPr id="48" name="TextBox 47"/>
+          <p:cNvSpPr txBox="1"/>
+          <p:nvPr/>
+        </p:nvSpPr>
+        <p:spPr>
+          <a:xfrm>
+            <a:off x="4393266" y="3068960"/>
+            <a:ext cx="1241784" cy="276999"/>
+          </a:xfrm>
+          <a:prstGeom prst="rect">
+            <a:avLst/>
+          </a:prstGeom>
+          <a:noFill/>
+        </p:spPr>
+        <p:txBody>
+          <a:bodyPr wrap="square" rtlCol="0">
+            <a:spAutoFit/>
+          </a:bodyPr>
+          <a:lstStyle/>
+          <a:p>
+            <a:r>
+              <a:rPr lang="it-IT" sz="1200" dirty="0" err="1" smtClean="0"/>
+              <a:t>languageName</a:t>
+            </a:r>
+            <a:endParaRPr lang="it-IT" sz="1200" dirty="0"/>
+          </a:p>
+        </p:txBody>
+      </p:sp>
+      <p:cxnSp>
+        <p:nvCxnSpPr>
+          <p:cNvPr id="49" name="Straight Arrow Connector 48"/>
+          <p:cNvCxnSpPr>
+            <a:stCxn id="35" idx="3"/>
+            <a:endCxn id="124" idx="1"/>
+          </p:cNvCxnSpPr>
+          <p:nvPr/>
+        </p:nvCxnSpPr>
+        <p:spPr>
+          <a:xfrm>
+            <a:off x="4246234" y="2978273"/>
+            <a:ext cx="1408039" cy="0"/>
+          </a:xfrm>
+          <a:prstGeom prst="straightConnector1">
+            <a:avLst/>
+          </a:prstGeom>
+          <a:ln>
+            <a:tailEnd type="arrow"/>
+          </a:ln>
+        </p:spPr>
+        <p:style>
+          <a:lnRef idx="2">
+            <a:schemeClr val="dk1"/>
+          </a:lnRef>
+          <a:fillRef idx="0">
+            <a:schemeClr val="dk1"/>
+          </a:fillRef>
+          <a:effectRef idx="1">
+            <a:schemeClr val="dk1"/>
+          </a:effectRef>
+          <a:fontRef idx="minor">
+            <a:schemeClr val="tx1"/>
+          </a:fontRef>
+        </p:style>
+      </p:cxnSp>
+      <p:sp>
+        <p:nvSpPr>
+          <p:cNvPr id="56" name="TextBox 55"/>
+          <p:cNvSpPr txBox="1"/>
+          <p:nvPr/>
+        </p:nvSpPr>
+        <p:spPr>
+          <a:xfrm>
+            <a:off x="4321278" y="2708920"/>
+            <a:ext cx="1296124" cy="276999"/>
+          </a:xfrm>
+          <a:prstGeom prst="rect">
+            <a:avLst/>
+          </a:prstGeom>
+          <a:noFill/>
+        </p:spPr>
+        <p:txBody>
+          <a:bodyPr wrap="square" rtlCol="0">
+            <a:spAutoFit/>
+          </a:bodyPr>
+          <a:lstStyle/>
+          <a:p>
+            <a:r>
+              <a:rPr lang="it-IT" sz="1200" dirty="0" err="1" smtClean="0"/>
+              <a:t>languageCode</a:t>
+            </a:r>
+            <a:endParaRPr lang="it-IT" sz="1200" dirty="0"/>
+          </a:p>
+        </p:txBody>
+      </p:sp>
+      <p:cxnSp>
+        <p:nvCxnSpPr>
+          <p:cNvPr id="57" name="Straight Arrow Connector 56"/>
+          <p:cNvCxnSpPr>
+            <a:stCxn id="99" idx="2"/>
+            <a:endCxn id="35" idx="1"/>
+          </p:cNvCxnSpPr>
+          <p:nvPr/>
+        </p:nvCxnSpPr>
+        <p:spPr>
+          <a:xfrm>
+            <a:off x="1001546" y="1700808"/>
+            <a:ext cx="1804528" cy="1277465"/>
+          </a:xfrm>
+          <a:prstGeom prst="straightConnector1">
+            <a:avLst/>
+          </a:prstGeom>
+          <a:ln>
+            <a:tailEnd type="arrow"/>
+          </a:ln>
+        </p:spPr>
+        <p:style>
+          <a:lnRef idx="2">
+            <a:schemeClr val="dk1"/>
+          </a:lnRef>
+          <a:fillRef idx="0">
+            <a:schemeClr val="dk1"/>
+          </a:fillRef>
+          <a:effectRef idx="1">
+            <a:schemeClr val="dk1"/>
+          </a:effectRef>
+          <a:fontRef idx="minor">
+            <a:schemeClr val="tx1"/>
+          </a:fontRef>
+        </p:style>
+      </p:cxnSp>
+      <p:sp>
+        <p:nvSpPr>
+          <p:cNvPr id="60" name="TextBox 59"/>
+          <p:cNvSpPr txBox="1"/>
+          <p:nvPr/>
+        </p:nvSpPr>
+        <p:spPr>
+          <a:xfrm>
+            <a:off x="1728970" y="2204864"/>
+            <a:ext cx="1296124" cy="276999"/>
+          </a:xfrm>
+          <a:prstGeom prst="rect">
+            <a:avLst/>
+          </a:prstGeom>
+          <a:noFill/>
+        </p:spPr>
+        <p:txBody>
+          <a:bodyPr wrap="square" rtlCol="0">
+            <a:spAutoFit/>
+          </a:bodyPr>
+          <a:lstStyle/>
+          <a:p>
+            <a:r>
+              <a:rPr lang="it-IT" sz="1200" dirty="0" err="1" smtClean="0"/>
+              <a:t>knowsLanguage</a:t>
+            </a:r>
+            <a:endParaRPr lang="it-IT" sz="1200" dirty="0"/>
+          </a:p>
+        </p:txBody>
+      </p:sp>
+      <p:sp>
+        <p:nvSpPr>
+          <p:cNvPr id="61" name="TextBox 60"/>
+          <p:cNvSpPr txBox="1"/>
+          <p:nvPr/>
+        </p:nvSpPr>
+        <p:spPr>
+          <a:xfrm>
+            <a:off x="35506" y="2276872"/>
+            <a:ext cx="1224126" cy="276999"/>
+          </a:xfrm>
+          <a:prstGeom prst="rect">
+            <a:avLst/>
+          </a:prstGeom>
+          <a:noFill/>
+        </p:spPr>
+        <p:txBody>
+          <a:bodyPr wrap="square" rtlCol="0">
+            <a:spAutoFit/>
+          </a:bodyPr>
+          <a:lstStyle/>
+          <a:p>
+            <a:r>
+              <a:rPr lang="it-IT" sz="1200" dirty="0" err="1" smtClean="0"/>
+              <a:t>languageLevel</a:t>
+            </a:r>
+            <a:r>
+              <a:rPr lang="it-IT" sz="1200" dirty="0" smtClean="0"/>
+              <a:t>*</a:t>
+            </a:r>
+            <a:endParaRPr lang="it-IT" sz="1200" dirty="0"/>
+          </a:p>
+        </p:txBody>
+      </p:sp>
+      <p:sp>
+        <p:nvSpPr>
+          <p:cNvPr id="67" name="TextBox 66"/>
+          <p:cNvSpPr txBox="1"/>
+          <p:nvPr/>
+        </p:nvSpPr>
+        <p:spPr>
+          <a:xfrm>
+            <a:off x="-71230" y="2901232"/>
+            <a:ext cx="792068" cy="461665"/>
+          </a:xfrm>
+          <a:prstGeom prst="rect">
+            <a:avLst/>
+          </a:prstGeom>
+          <a:noFill/>
+        </p:spPr>
+        <p:txBody>
+          <a:bodyPr wrap="square" rtlCol="0">
+            <a:spAutoFit/>
+          </a:bodyPr>
+          <a:lstStyle/>
+          <a:p>
+            <a:r>
+              <a:rPr lang="it-IT" sz="1200" dirty="0" err="1" smtClean="0">
+                <a:solidFill>
+                  <a:schemeClr val="accent6">
+                    <a:lumMod val="75000"/>
+                  </a:schemeClr>
+                </a:solidFill>
+              </a:rPr>
+              <a:t>xsd:string</a:t>
+            </a:r>
+            <a:endParaRPr lang="it-IT" sz="1200" dirty="0" smtClean="0">
+              <a:solidFill>
+                <a:schemeClr val="accent6">
+                  <a:lumMod val="75000"/>
+                </a:schemeClr>
+              </a:solidFill>
+            </a:endParaRPr>
+          </a:p>
+          <a:p>
+            <a:r>
+              <a:rPr lang="it-IT" sz="1200" dirty="0" smtClean="0">
+                <a:solidFill>
+                  <a:schemeClr val="accent6">
+                    <a:lumMod val="75000"/>
+                  </a:schemeClr>
+                </a:solidFill>
+              </a:rPr>
+              <a:t>(C1, C2…)</a:t>
+            </a:r>
+            <a:endParaRPr lang="it-IT" sz="1200" dirty="0">
+              <a:solidFill>
+                <a:schemeClr val="accent6">
+                  <a:lumMod val="75000"/>
+                </a:schemeClr>
+              </a:solidFill>
+            </a:endParaRPr>
+          </a:p>
+        </p:txBody>
+      </p:sp>
+      <p:sp>
+        <p:nvSpPr>
+          <p:cNvPr id="70" name="TextBox 69"/>
+          <p:cNvSpPr txBox="1"/>
+          <p:nvPr/>
+        </p:nvSpPr>
+        <p:spPr>
+          <a:xfrm>
+            <a:off x="-36492" y="2439567"/>
+            <a:ext cx="792068" cy="461665"/>
+          </a:xfrm>
+          <a:prstGeom prst="rect">
+            <a:avLst/>
+          </a:prstGeom>
+          <a:noFill/>
+        </p:spPr>
+        <p:txBody>
+          <a:bodyPr wrap="square" rtlCol="0">
+            <a:spAutoFit/>
+          </a:bodyPr>
+          <a:lstStyle/>
+          <a:p>
+            <a:r>
+              <a:rPr lang="it-IT" sz="1200" dirty="0" err="1" smtClean="0">
+                <a:solidFill>
+                  <a:schemeClr val="accent6">
+                    <a:lumMod val="75000"/>
+                  </a:schemeClr>
+                </a:solidFill>
+              </a:rPr>
+              <a:t>xsd:string</a:t>
+            </a:r>
+            <a:endParaRPr lang="it-IT" sz="1200" dirty="0" smtClean="0">
+              <a:solidFill>
+                <a:schemeClr val="accent6">
+                  <a:lumMod val="75000"/>
+                </a:schemeClr>
+              </a:solidFill>
+            </a:endParaRPr>
+          </a:p>
+          <a:p>
+            <a:r>
+              <a:rPr lang="it-IT" sz="1200" dirty="0" smtClean="0">
+                <a:solidFill>
+                  <a:schemeClr val="accent6">
+                    <a:lumMod val="75000"/>
+                  </a:schemeClr>
+                </a:solidFill>
+              </a:rPr>
+              <a:t>(native…)</a:t>
+            </a:r>
+            <a:endParaRPr lang="it-IT" sz="1200" dirty="0">
+              <a:solidFill>
+                <a:schemeClr val="accent6">
+                  <a:lumMod val="75000"/>
+                </a:schemeClr>
+              </a:solidFill>
+            </a:endParaRPr>
+          </a:p>
+        </p:txBody>
+      </p:sp>
+      <p:cxnSp>
+        <p:nvCxnSpPr>
+          <p:cNvPr id="71" name="Straight Arrow Connector 70"/>
+          <p:cNvCxnSpPr>
+            <a:stCxn id="99" idx="2"/>
+            <a:endCxn id="67" idx="0"/>
+          </p:cNvCxnSpPr>
+          <p:nvPr/>
+        </p:nvCxnSpPr>
+        <p:spPr>
+          <a:xfrm flipH="1">
+            <a:off x="324804" y="1700808"/>
+            <a:ext cx="676742" cy="1200424"/>
+          </a:xfrm>
+          <a:prstGeom prst="straightConnector1">
+            <a:avLst/>
+          </a:prstGeom>
+          <a:ln>
+            <a:tailEnd type="arrow"/>
+          </a:ln>
+        </p:spPr>
+        <p:style>
+          <a:lnRef idx="2">
+            <a:schemeClr val="dk1"/>
+          </a:lnRef>
+          <a:fillRef idx="0">
+            <a:schemeClr val="dk1"/>
+          </a:fillRef>
+          <a:effectRef idx="1">
+            <a:schemeClr val="dk1"/>
+          </a:effectRef>
+          <a:fontRef idx="minor">
+            <a:schemeClr val="tx1"/>
+          </a:fontRef>
+        </p:style>
+      </p:cxnSp>
+      <p:sp>
+        <p:nvSpPr>
+          <p:cNvPr id="72" name="TextBox 71"/>
+          <p:cNvSpPr txBox="1"/>
+          <p:nvPr/>
+        </p:nvSpPr>
+        <p:spPr>
+          <a:xfrm>
+            <a:off x="-32460" y="1783849"/>
+            <a:ext cx="1220084" cy="276999"/>
+          </a:xfrm>
+          <a:prstGeom prst="rect">
+            <a:avLst/>
+          </a:prstGeom>
+          <a:noFill/>
+        </p:spPr>
+        <p:txBody>
+          <a:bodyPr wrap="square" rtlCol="0">
+            <a:spAutoFit/>
+          </a:bodyPr>
+          <a:lstStyle/>
+          <a:p>
+            <a:r>
+              <a:rPr lang="it-IT" sz="1200" dirty="0" err="1" smtClean="0"/>
+              <a:t>languageType</a:t>
+            </a:r>
+            <a:r>
+              <a:rPr lang="it-IT" sz="1200" dirty="0" smtClean="0"/>
+              <a:t>*</a:t>
+            </a:r>
+          </a:p>
+        </p:txBody>
+      </p:sp>
+      <p:cxnSp>
+        <p:nvCxnSpPr>
+          <p:cNvPr id="74" name="Curved Connector 73"/>
+          <p:cNvCxnSpPr>
+            <a:stCxn id="99" idx="2"/>
+            <a:endCxn id="70" idx="0"/>
+          </p:cNvCxnSpPr>
+          <p:nvPr/>
+        </p:nvCxnSpPr>
+        <p:spPr>
+          <a:xfrm rot="5400000">
+            <a:off x="311165" y="1749185"/>
+            <a:ext cx="738759" cy="642004"/>
+          </a:xfrm>
+          <a:prstGeom prst="curvedConnector3">
+            <a:avLst>
+              <a:gd name="adj1" fmla="val 50000"/>
+            </a:avLst>
+          </a:prstGeom>
+          <a:ln>
+            <a:tailEnd type="arrow"/>
+          </a:ln>
+        </p:spPr>
+        <p:style>
+          <a:lnRef idx="2">
+            <a:schemeClr val="dk1"/>
+          </a:lnRef>
+          <a:fillRef idx="0">
+            <a:schemeClr val="dk1"/>
+          </a:fillRef>
+          <a:effectRef idx="1">
+            <a:schemeClr val="dk1"/>
+          </a:effectRef>
+          <a:fontRef idx="minor">
+            <a:schemeClr val="tx1"/>
+          </a:fontRef>
+        </p:style>
+      </p:cxnSp>
+      <p:cxnSp>
+        <p:nvCxnSpPr>
+          <p:cNvPr id="93" name="Straight Arrow Connector 92"/>
+          <p:cNvCxnSpPr>
+            <a:stCxn id="99" idx="2"/>
+            <a:endCxn id="34" idx="0"/>
+          </p:cNvCxnSpPr>
+          <p:nvPr/>
+        </p:nvCxnSpPr>
+        <p:spPr>
+          <a:xfrm>
+            <a:off x="1001546" y="1700808"/>
+            <a:ext cx="2527624" cy="541414"/>
+          </a:xfrm>
+          <a:prstGeom prst="straightConnector1">
+            <a:avLst/>
+          </a:prstGeom>
+          <a:ln>
+            <a:tailEnd type="arrow"/>
+          </a:ln>
+        </p:spPr>
+        <p:style>
+          <a:lnRef idx="2">
+            <a:schemeClr val="dk1"/>
+          </a:lnRef>
+          <a:fillRef idx="0">
+            <a:schemeClr val="dk1"/>
+          </a:fillRef>
+          <a:effectRef idx="1">
+            <a:schemeClr val="dk1"/>
+          </a:effectRef>
+          <a:fontRef idx="minor">
+            <a:schemeClr val="tx1"/>
+          </a:fontRef>
+        </p:style>
+      </p:cxnSp>
+      <p:sp>
+        <p:nvSpPr>
+          <p:cNvPr id="96" name="TextBox 95"/>
+          <p:cNvSpPr txBox="1"/>
+          <p:nvPr/>
+        </p:nvSpPr>
+        <p:spPr>
+          <a:xfrm>
+            <a:off x="2037842" y="1711841"/>
+            <a:ext cx="792068" cy="276999"/>
+          </a:xfrm>
+          <a:prstGeom prst="rect">
+            <a:avLst/>
+          </a:prstGeom>
+          <a:noFill/>
+        </p:spPr>
+        <p:txBody>
+          <a:bodyPr wrap="square" rtlCol="0">
+            <a:spAutoFit/>
+          </a:bodyPr>
+          <a:lstStyle/>
+          <a:p>
+            <a:r>
+              <a:rPr lang="it-IT" sz="1200" dirty="0" err="1" smtClean="0"/>
+              <a:t>worksAt</a:t>
+            </a:r>
+            <a:endParaRPr lang="it-IT" sz="1200" dirty="0"/>
+          </a:p>
+        </p:txBody>
+      </p:sp>
+      <p:cxnSp>
+        <p:nvCxnSpPr>
+          <p:cNvPr id="97" name="Straight Arrow Connector 96"/>
+          <p:cNvCxnSpPr>
+            <a:stCxn id="36" idx="3"/>
+            <a:endCxn id="91" idx="1"/>
+          </p:cNvCxnSpPr>
+          <p:nvPr/>
+        </p:nvCxnSpPr>
+        <p:spPr>
+          <a:xfrm>
+            <a:off x="4246234" y="3554337"/>
+            <a:ext cx="1137358" cy="5905"/>
+          </a:xfrm>
+          <a:prstGeom prst="straightConnector1">
+            <a:avLst/>
+          </a:prstGeom>
+          <a:ln>
+            <a:tailEnd type="arrow"/>
+          </a:ln>
+        </p:spPr>
+        <p:style>
+          <a:lnRef idx="2">
+            <a:schemeClr val="dk1"/>
+          </a:lnRef>
+          <a:fillRef idx="0">
+            <a:schemeClr val="dk1"/>
+          </a:fillRef>
+          <a:effectRef idx="1">
+            <a:schemeClr val="dk1"/>
+          </a:effectRef>
+          <a:fontRef idx="minor">
+            <a:schemeClr val="tx1"/>
+          </a:fontRef>
+        </p:style>
+      </p:cxnSp>
+      <p:sp>
+        <p:nvSpPr>
+          <p:cNvPr id="100" name="TextBox 99"/>
+          <p:cNvSpPr txBox="1"/>
+          <p:nvPr/>
+        </p:nvSpPr>
+        <p:spPr>
+          <a:xfrm>
+            <a:off x="4681298" y="3512041"/>
+            <a:ext cx="1512168" cy="276999"/>
+          </a:xfrm>
+          <a:prstGeom prst="rect">
+            <a:avLst/>
+          </a:prstGeom>
+          <a:noFill/>
+        </p:spPr>
+        <p:txBody>
+          <a:bodyPr wrap="square" rtlCol="0">
+            <a:spAutoFit/>
+          </a:bodyPr>
+          <a:lstStyle/>
+          <a:p>
+            <a:r>
+              <a:rPr lang="it-IT" sz="1200" dirty="0" err="1" smtClean="0"/>
+              <a:t>amountsTo</a:t>
+            </a:r>
+            <a:endParaRPr lang="it-IT" sz="1200" dirty="0"/>
+          </a:p>
+        </p:txBody>
+      </p:sp>
+      <p:sp>
+        <p:nvSpPr>
+          <p:cNvPr id="101" name="TextBox 100"/>
+          <p:cNvSpPr txBox="1"/>
+          <p:nvPr/>
+        </p:nvSpPr>
+        <p:spPr>
+          <a:xfrm>
+            <a:off x="7878516" y="2852936"/>
+            <a:ext cx="979246" cy="276999"/>
+          </a:xfrm>
+          <a:prstGeom prst="rect">
+            <a:avLst/>
+          </a:prstGeom>
+          <a:noFill/>
+        </p:spPr>
+        <p:txBody>
+          <a:bodyPr wrap="square" rtlCol="0">
+            <a:spAutoFit/>
+          </a:bodyPr>
+          <a:lstStyle/>
+          <a:p>
+            <a:r>
+              <a:rPr lang="it-IT" sz="1200" dirty="0" err="1" smtClean="0">
+                <a:solidFill>
+                  <a:schemeClr val="accent6">
+                    <a:lumMod val="75000"/>
+                  </a:schemeClr>
+                </a:solidFill>
+              </a:rPr>
+              <a:t>xsd:double</a:t>
+            </a:r>
+            <a:endParaRPr lang="it-IT" sz="1200" dirty="0">
+              <a:solidFill>
+                <a:schemeClr val="accent6">
+                  <a:lumMod val="75000"/>
+                </a:schemeClr>
+              </a:solidFill>
+            </a:endParaRPr>
+          </a:p>
+        </p:txBody>
+      </p:sp>
+      <p:cxnSp>
+        <p:nvCxnSpPr>
+          <p:cNvPr id="105" name="Straight Arrow Connector 104"/>
+          <p:cNvCxnSpPr>
+            <a:stCxn id="34" idx="3"/>
+            <a:endCxn id="141" idx="2"/>
+          </p:cNvCxnSpPr>
+          <p:nvPr/>
+        </p:nvCxnSpPr>
+        <p:spPr>
+          <a:xfrm flipV="1">
+            <a:off x="4249250" y="1750948"/>
+            <a:ext cx="985528" cy="688619"/>
+          </a:xfrm>
+          <a:prstGeom prst="straightConnector1">
+            <a:avLst/>
+          </a:prstGeom>
+          <a:ln>
+            <a:tailEnd type="arrow"/>
+          </a:ln>
+        </p:spPr>
+        <p:style>
+          <a:lnRef idx="2">
+            <a:schemeClr val="accent1"/>
+          </a:lnRef>
+          <a:fillRef idx="0">
+            <a:schemeClr val="accent1"/>
+          </a:fillRef>
+          <a:effectRef idx="1">
+            <a:schemeClr val="accent1"/>
+          </a:effectRef>
+          <a:fontRef idx="minor">
+            <a:schemeClr val="tx1"/>
+          </a:fontRef>
+        </p:style>
+      </p:cxnSp>
+      <p:sp>
+        <p:nvSpPr>
+          <p:cNvPr id="107" name="TextBox 106"/>
+          <p:cNvSpPr txBox="1"/>
+          <p:nvPr/>
+        </p:nvSpPr>
+        <p:spPr>
+          <a:xfrm>
+            <a:off x="4141238" y="1844824"/>
+            <a:ext cx="2124236" cy="276999"/>
+          </a:xfrm>
+          <a:prstGeom prst="rect">
+            <a:avLst/>
+          </a:prstGeom>
+          <a:noFill/>
+        </p:spPr>
+        <p:txBody>
+          <a:bodyPr wrap="square" rtlCol="0">
+            <a:spAutoFit/>
+          </a:bodyPr>
+          <a:lstStyle/>
+          <a:p>
+            <a:r>
+              <a:rPr lang="it-IT" sz="1200" dirty="0" err="1" smtClean="0">
+                <a:solidFill>
+                  <a:srgbClr val="0070C0"/>
+                </a:solidFill>
+              </a:rPr>
+              <a:t>rdfs:subClassOf</a:t>
+            </a:r>
+            <a:r>
+              <a:rPr lang="it-IT" sz="1200" dirty="0" smtClean="0">
+                <a:solidFill>
+                  <a:srgbClr val="0070C0"/>
+                </a:solidFill>
+              </a:rPr>
+              <a:t> </a:t>
+            </a:r>
+            <a:endParaRPr lang="it-IT" sz="1200" dirty="0">
+              <a:solidFill>
+                <a:srgbClr val="0070C0"/>
+              </a:solidFill>
+            </a:endParaRPr>
+          </a:p>
+        </p:txBody>
+      </p:sp>
+      <p:cxnSp>
+        <p:nvCxnSpPr>
+          <p:cNvPr id="112" name="Straight Arrow Connector 111"/>
+          <p:cNvCxnSpPr>
+            <a:stCxn id="35" idx="3"/>
+            <a:endCxn id="147" idx="1"/>
+          </p:cNvCxnSpPr>
+          <p:nvPr/>
+        </p:nvCxnSpPr>
+        <p:spPr>
+          <a:xfrm flipV="1">
+            <a:off x="4246234" y="2451299"/>
+            <a:ext cx="3422110" cy="526974"/>
+          </a:xfrm>
+          <a:prstGeom prst="straightConnector1">
+            <a:avLst/>
+          </a:prstGeom>
+          <a:ln>
+            <a:tailEnd type="arrow"/>
+          </a:ln>
+        </p:spPr>
+        <p:style>
+          <a:lnRef idx="2">
+            <a:schemeClr val="accent1"/>
+          </a:lnRef>
+          <a:fillRef idx="0">
+            <a:schemeClr val="accent1"/>
+          </a:fillRef>
+          <a:effectRef idx="1">
+            <a:schemeClr val="accent1"/>
+          </a:effectRef>
+          <a:fontRef idx="minor">
+            <a:schemeClr val="tx1"/>
+          </a:fontRef>
+        </p:style>
+      </p:cxnSp>
+      <p:cxnSp>
+        <p:nvCxnSpPr>
+          <p:cNvPr id="113" name="Straight Arrow Connector 112"/>
+          <p:cNvCxnSpPr>
+            <a:stCxn id="36" idx="3"/>
+            <a:endCxn id="147" idx="1"/>
+          </p:cNvCxnSpPr>
+          <p:nvPr/>
+        </p:nvCxnSpPr>
+        <p:spPr>
+          <a:xfrm flipV="1">
+            <a:off x="4246234" y="2451299"/>
+            <a:ext cx="3422110" cy="1103038"/>
+          </a:xfrm>
+          <a:prstGeom prst="straightConnector1">
+            <a:avLst/>
+          </a:prstGeom>
+          <a:ln>
+            <a:tailEnd type="arrow"/>
+          </a:ln>
+        </p:spPr>
+        <p:style>
+          <a:lnRef idx="2">
+            <a:schemeClr val="accent1"/>
+          </a:lnRef>
+          <a:fillRef idx="0">
+            <a:schemeClr val="accent1"/>
+          </a:fillRef>
+          <a:effectRef idx="1">
+            <a:schemeClr val="accent1"/>
+          </a:effectRef>
+          <a:fontRef idx="minor">
+            <a:schemeClr val="tx1"/>
+          </a:fontRef>
+        </p:style>
+      </p:cxnSp>
+      <p:cxnSp>
+        <p:nvCxnSpPr>
+          <p:cNvPr id="116" name="Straight Arrow Connector 115"/>
+          <p:cNvCxnSpPr>
+            <a:stCxn id="37" idx="3"/>
+            <a:endCxn id="142" idx="1"/>
+          </p:cNvCxnSpPr>
+          <p:nvPr/>
+        </p:nvCxnSpPr>
+        <p:spPr>
+          <a:xfrm flipV="1">
+            <a:off x="4249250" y="3897927"/>
+            <a:ext cx="3424895" cy="232474"/>
+          </a:xfrm>
+          <a:prstGeom prst="straightConnector1">
+            <a:avLst/>
+          </a:prstGeom>
+          <a:ln>
+            <a:tailEnd type="arrow"/>
+          </a:ln>
+        </p:spPr>
+        <p:style>
+          <a:lnRef idx="2">
+            <a:schemeClr val="accent1"/>
+          </a:lnRef>
+          <a:fillRef idx="0">
+            <a:schemeClr val="accent1"/>
+          </a:fillRef>
+          <a:effectRef idx="1">
+            <a:schemeClr val="accent1"/>
+          </a:effectRef>
+          <a:fontRef idx="minor">
+            <a:schemeClr val="tx1"/>
+          </a:fontRef>
+        </p:style>
+      </p:cxnSp>
+      <p:cxnSp>
+        <p:nvCxnSpPr>
+          <p:cNvPr id="119" name="Straight Arrow Connector 118"/>
+          <p:cNvCxnSpPr>
+            <a:stCxn id="37" idx="3"/>
+            <a:endCxn id="122" idx="1"/>
+          </p:cNvCxnSpPr>
+          <p:nvPr/>
+        </p:nvCxnSpPr>
+        <p:spPr>
+          <a:xfrm>
+            <a:off x="4249250" y="4130401"/>
+            <a:ext cx="1397964" cy="397398"/>
+          </a:xfrm>
+          <a:prstGeom prst="straightConnector1">
+            <a:avLst/>
+          </a:prstGeom>
+          <a:ln>
+            <a:tailEnd type="arrow"/>
+          </a:ln>
+        </p:spPr>
+        <p:style>
+          <a:lnRef idx="2">
+            <a:schemeClr val="dk1"/>
+          </a:lnRef>
+          <a:fillRef idx="0">
+            <a:schemeClr val="dk1"/>
+          </a:fillRef>
+          <a:effectRef idx="1">
+            <a:schemeClr val="dk1"/>
+          </a:effectRef>
+          <a:fontRef idx="minor">
+            <a:schemeClr val="tx1"/>
+          </a:fontRef>
+        </p:style>
+      </p:cxnSp>
+      <p:sp>
+        <p:nvSpPr>
+          <p:cNvPr id="122" name="Rounded Rectangle 121"/>
+          <p:cNvSpPr/>
+          <p:nvPr/>
+        </p:nvSpPr>
+        <p:spPr>
+          <a:xfrm>
+            <a:off x="5647214" y="4330454"/>
+            <a:ext cx="2373328" cy="394690"/>
+          </a:xfrm>
+          <a:prstGeom prst="roundRect">
+            <a:avLst/>
+          </a:prstGeom>
+        </p:spPr>
+        <p:style>
+          <a:lnRef idx="3">
+            <a:schemeClr val="lt1"/>
+          </a:lnRef>
+          <a:fillRef idx="1">
+            <a:schemeClr val="accent3"/>
+          </a:fillRef>
+          <a:effectRef idx="1">
+            <a:schemeClr val="accent3"/>
+          </a:effectRef>
+          <a:fontRef idx="minor">
+            <a:schemeClr val="lt1"/>
+          </a:fontRef>
+        </p:style>
+        <p:txBody>
+          <a:bodyPr rtlCol="0" anchor="ctr"/>
+          <a:lstStyle/>
+          <a:p>
+            <a:pPr algn="ctr"/>
+            <a:r>
+              <a:rPr lang="it-IT" dirty="0" err="1" smtClean="0"/>
+              <a:t>CertificationAuthority</a:t>
+            </a:r>
+            <a:endParaRPr lang="it-IT" dirty="0"/>
+          </a:p>
+        </p:txBody>
+      </p:sp>
+      <p:sp>
+        <p:nvSpPr>
+          <p:cNvPr id="124" name="TextBox 123"/>
+          <p:cNvSpPr txBox="1"/>
+          <p:nvPr/>
+        </p:nvSpPr>
+        <p:spPr>
+          <a:xfrm>
+            <a:off x="5654273" y="2839773"/>
+            <a:ext cx="792068" cy="276999"/>
+          </a:xfrm>
+          <a:prstGeom prst="rect">
+            <a:avLst/>
+          </a:prstGeom>
+          <a:noFill/>
+        </p:spPr>
+        <p:txBody>
+          <a:bodyPr wrap="square" rtlCol="0">
+            <a:spAutoFit/>
+          </a:bodyPr>
+          <a:lstStyle/>
+          <a:p>
+            <a:r>
+              <a:rPr lang="it-IT" sz="1200" dirty="0" err="1" smtClean="0">
+                <a:solidFill>
+                  <a:schemeClr val="accent6">
+                    <a:lumMod val="75000"/>
+                  </a:schemeClr>
+                </a:solidFill>
+              </a:rPr>
+              <a:t>xsd:string</a:t>
+            </a:r>
+            <a:endParaRPr lang="it-IT" sz="1200" dirty="0" smtClean="0">
+              <a:solidFill>
+                <a:schemeClr val="accent6">
+                  <a:lumMod val="75000"/>
+                </a:schemeClr>
+              </a:solidFill>
+            </a:endParaRPr>
+          </a:p>
+        </p:txBody>
+      </p:sp>
+      <p:sp>
+        <p:nvSpPr>
+          <p:cNvPr id="127" name="TextBox 126"/>
+          <p:cNvSpPr txBox="1"/>
+          <p:nvPr/>
+        </p:nvSpPr>
+        <p:spPr>
+          <a:xfrm>
+            <a:off x="5617402" y="3140968"/>
+            <a:ext cx="792068" cy="276999"/>
+          </a:xfrm>
+          <a:prstGeom prst="rect">
+            <a:avLst/>
+          </a:prstGeom>
+          <a:noFill/>
+        </p:spPr>
+        <p:txBody>
+          <a:bodyPr wrap="square" rtlCol="0">
+            <a:spAutoFit/>
+          </a:bodyPr>
+          <a:lstStyle/>
+          <a:p>
+            <a:r>
+              <a:rPr lang="it-IT" sz="1200" dirty="0" err="1" smtClean="0">
+                <a:solidFill>
+                  <a:schemeClr val="accent6">
+                    <a:lumMod val="75000"/>
+                  </a:schemeClr>
+                </a:solidFill>
+              </a:rPr>
+              <a:t>xsd:string</a:t>
+            </a:r>
+            <a:endParaRPr lang="it-IT" sz="1200" dirty="0" smtClean="0">
+              <a:solidFill>
+                <a:schemeClr val="accent6">
+                  <a:lumMod val="75000"/>
+                </a:schemeClr>
+              </a:solidFill>
+            </a:endParaRPr>
+          </a:p>
+        </p:txBody>
+      </p:sp>
+      <p:sp>
+        <p:nvSpPr>
+          <p:cNvPr id="132" name="TextBox 131"/>
+          <p:cNvSpPr txBox="1"/>
+          <p:nvPr/>
+        </p:nvSpPr>
+        <p:spPr>
+          <a:xfrm>
+            <a:off x="4480044" y="3933056"/>
+            <a:ext cx="903548" cy="276999"/>
+          </a:xfrm>
+          <a:prstGeom prst="rect">
+            <a:avLst/>
+          </a:prstGeom>
+          <a:noFill/>
+        </p:spPr>
+        <p:txBody>
+          <a:bodyPr wrap="square" rtlCol="0">
+            <a:spAutoFit/>
+          </a:bodyPr>
+          <a:lstStyle/>
+          <a:p>
+            <a:r>
+              <a:rPr lang="it-IT" sz="1200" dirty="0" err="1" smtClean="0"/>
+              <a:t>issuedBy</a:t>
+            </a:r>
+            <a:endParaRPr lang="it-IT" sz="1200" dirty="0"/>
+          </a:p>
+        </p:txBody>
+      </p:sp>
+      <p:cxnSp>
+        <p:nvCxnSpPr>
+          <p:cNvPr id="135" name="Straight Arrow Connector 134"/>
+          <p:cNvCxnSpPr>
+            <a:stCxn id="37" idx="3"/>
+          </p:cNvCxnSpPr>
+          <p:nvPr/>
+        </p:nvCxnSpPr>
+        <p:spPr>
+          <a:xfrm>
+            <a:off x="4249250" y="4130401"/>
+            <a:ext cx="1424878" cy="419502"/>
+          </a:xfrm>
+          <a:prstGeom prst="straightConnector1">
+            <a:avLst/>
+          </a:prstGeom>
+          <a:ln>
+            <a:tailEnd type="arrow"/>
+          </a:ln>
+        </p:spPr>
+        <p:style>
+          <a:lnRef idx="2">
+            <a:schemeClr val="dk1"/>
+          </a:lnRef>
+          <a:fillRef idx="0">
+            <a:schemeClr val="dk1"/>
+          </a:fillRef>
+          <a:effectRef idx="1">
+            <a:schemeClr val="dk1"/>
+          </a:effectRef>
+          <a:fontRef idx="minor">
+            <a:schemeClr val="tx1"/>
+          </a:fontRef>
+        </p:style>
+      </p:cxnSp>
+      <p:sp>
+        <p:nvSpPr>
+          <p:cNvPr id="136" name="TextBox 135"/>
+          <p:cNvSpPr txBox="1"/>
+          <p:nvPr/>
+        </p:nvSpPr>
+        <p:spPr>
+          <a:xfrm>
+            <a:off x="4645294" y="4232121"/>
+            <a:ext cx="1116124" cy="276999"/>
+          </a:xfrm>
+          <a:prstGeom prst="rect">
+            <a:avLst/>
+          </a:prstGeom>
+          <a:noFill/>
+        </p:spPr>
+        <p:txBody>
+          <a:bodyPr wrap="square" rtlCol="0">
+            <a:spAutoFit/>
+          </a:bodyPr>
+          <a:lstStyle/>
+          <a:p>
+            <a:r>
+              <a:rPr lang="it-IT" sz="1200" dirty="0" err="1" smtClean="0"/>
+              <a:t>expirationDate</a:t>
+            </a:r>
+            <a:endParaRPr lang="it-IT" sz="1200" dirty="0"/>
+          </a:p>
+        </p:txBody>
+      </p:sp>
+      <p:sp>
+        <p:nvSpPr>
+          <p:cNvPr id="138" name="TextBox 137"/>
+          <p:cNvSpPr txBox="1"/>
+          <p:nvPr/>
+        </p:nvSpPr>
+        <p:spPr>
+          <a:xfrm>
+            <a:off x="5646268" y="4491057"/>
+            <a:ext cx="979246" cy="276999"/>
+          </a:xfrm>
+          <a:prstGeom prst="rect">
+            <a:avLst/>
+          </a:prstGeom>
+          <a:noFill/>
+        </p:spPr>
+        <p:txBody>
+          <a:bodyPr wrap="square" rtlCol="0">
+            <a:spAutoFit/>
+          </a:bodyPr>
+          <a:lstStyle/>
+          <a:p>
+            <a:r>
+              <a:rPr lang="it-IT" sz="1200" dirty="0" err="1" smtClean="0">
+                <a:solidFill>
+                  <a:schemeClr val="accent6">
+                    <a:lumMod val="75000"/>
+                  </a:schemeClr>
+                </a:solidFill>
+              </a:rPr>
+              <a:t>xsd:date</a:t>
+            </a:r>
+            <a:endParaRPr lang="it-IT" sz="1200" dirty="0">
+              <a:solidFill>
+                <a:schemeClr val="accent6">
+                  <a:lumMod val="75000"/>
+                </a:schemeClr>
+              </a:solidFill>
+            </a:endParaRPr>
+          </a:p>
+        </p:txBody>
+      </p:sp>
+      <p:cxnSp>
+        <p:nvCxnSpPr>
+          <p:cNvPr id="139" name="Straight Arrow Connector 138"/>
+          <p:cNvCxnSpPr>
+            <a:stCxn id="37" idx="3"/>
+            <a:endCxn id="143" idx="1"/>
+          </p:cNvCxnSpPr>
+          <p:nvPr/>
+        </p:nvCxnSpPr>
+        <p:spPr>
+          <a:xfrm>
+            <a:off x="4249250" y="4130401"/>
+            <a:ext cx="1613042" cy="733243"/>
+          </a:xfrm>
+          <a:prstGeom prst="straightConnector1">
+            <a:avLst/>
+          </a:prstGeom>
+          <a:ln>
+            <a:tailEnd type="arrow"/>
+          </a:ln>
+        </p:spPr>
+        <p:style>
+          <a:lnRef idx="2">
+            <a:schemeClr val="dk1"/>
+          </a:lnRef>
+          <a:fillRef idx="0">
+            <a:schemeClr val="dk1"/>
+          </a:fillRef>
+          <a:effectRef idx="1">
+            <a:schemeClr val="dk1"/>
+          </a:effectRef>
+          <a:fontRef idx="minor">
+            <a:schemeClr val="tx1"/>
+          </a:fontRef>
+        </p:style>
+      </p:cxnSp>
+      <p:sp>
+        <p:nvSpPr>
+          <p:cNvPr id="143" name="TextBox 142"/>
+          <p:cNvSpPr txBox="1"/>
+          <p:nvPr/>
+        </p:nvSpPr>
+        <p:spPr>
+          <a:xfrm>
+            <a:off x="5862292" y="4725144"/>
+            <a:ext cx="979246" cy="276999"/>
+          </a:xfrm>
+          <a:prstGeom prst="rect">
+            <a:avLst/>
+          </a:prstGeom>
+          <a:noFill/>
+        </p:spPr>
+        <p:txBody>
+          <a:bodyPr wrap="square" rtlCol="0">
+            <a:spAutoFit/>
+          </a:bodyPr>
+          <a:lstStyle/>
+          <a:p>
+            <a:r>
+              <a:rPr lang="it-IT" sz="1200" dirty="0" err="1" smtClean="0">
+                <a:solidFill>
+                  <a:schemeClr val="accent6">
+                    <a:lumMod val="75000"/>
+                  </a:schemeClr>
+                </a:solidFill>
+              </a:rPr>
+              <a:t>xsd:string</a:t>
+            </a:r>
+            <a:endParaRPr lang="it-IT" sz="1200" dirty="0">
+              <a:solidFill>
+                <a:schemeClr val="accent6">
+                  <a:lumMod val="75000"/>
+                </a:schemeClr>
+              </a:solidFill>
+            </a:endParaRPr>
+          </a:p>
+        </p:txBody>
+      </p:sp>
+      <p:sp>
+        <p:nvSpPr>
+          <p:cNvPr id="145" name="TextBox 144"/>
+          <p:cNvSpPr txBox="1"/>
+          <p:nvPr/>
+        </p:nvSpPr>
+        <p:spPr>
+          <a:xfrm>
+            <a:off x="4681298" y="4509120"/>
+            <a:ext cx="1375793" cy="276999"/>
+          </a:xfrm>
+          <a:prstGeom prst="rect">
+            <a:avLst/>
+          </a:prstGeom>
+          <a:noFill/>
+        </p:spPr>
+        <p:txBody>
+          <a:bodyPr wrap="square" rtlCol="0">
+            <a:spAutoFit/>
+          </a:bodyPr>
+          <a:lstStyle/>
+          <a:p>
+            <a:r>
+              <a:rPr lang="it-IT" sz="1200" dirty="0" err="1" smtClean="0"/>
+              <a:t>certificationTitle</a:t>
+            </a:r>
+            <a:endParaRPr lang="it-IT" sz="1200" dirty="0"/>
+          </a:p>
+        </p:txBody>
+      </p:sp>
+      <p:cxnSp>
+        <p:nvCxnSpPr>
+          <p:cNvPr id="149" name="Curved Connector 148"/>
+          <p:cNvCxnSpPr>
+            <a:stCxn id="99" idx="2"/>
+            <a:endCxn id="155" idx="0"/>
+          </p:cNvCxnSpPr>
+          <p:nvPr/>
+        </p:nvCxnSpPr>
+        <p:spPr>
+          <a:xfrm rot="16200000" flipH="1">
+            <a:off x="652394" y="2049959"/>
+            <a:ext cx="1512168" cy="813865"/>
+          </a:xfrm>
+          <a:prstGeom prst="curvedConnector3">
+            <a:avLst>
+              <a:gd name="adj1" fmla="val 50000"/>
+            </a:avLst>
+          </a:prstGeom>
+          <a:ln>
+            <a:tailEnd type="arrow"/>
+          </a:ln>
+        </p:spPr>
+        <p:style>
+          <a:lnRef idx="2">
+            <a:schemeClr val="dk1"/>
+          </a:lnRef>
+          <a:fillRef idx="0">
+            <a:schemeClr val="dk1"/>
+          </a:fillRef>
+          <a:effectRef idx="1">
+            <a:schemeClr val="dk1"/>
+          </a:effectRef>
+          <a:fontRef idx="minor">
+            <a:schemeClr val="tx1"/>
+          </a:fontRef>
+        </p:style>
+      </p:cxnSp>
+      <p:sp>
+        <p:nvSpPr>
+          <p:cNvPr id="155" name="TextBox 154"/>
+          <p:cNvSpPr txBox="1"/>
+          <p:nvPr/>
+        </p:nvSpPr>
+        <p:spPr>
+          <a:xfrm>
+            <a:off x="1325788" y="3212976"/>
+            <a:ext cx="979246" cy="276999"/>
+          </a:xfrm>
+          <a:prstGeom prst="rect">
+            <a:avLst/>
+          </a:prstGeom>
+          <a:noFill/>
+        </p:spPr>
+        <p:txBody>
+          <a:bodyPr wrap="square" rtlCol="0">
+            <a:spAutoFit/>
+          </a:bodyPr>
+          <a:lstStyle/>
+          <a:p>
+            <a:r>
+              <a:rPr lang="it-IT" sz="1200" dirty="0" err="1" smtClean="0">
+                <a:solidFill>
+                  <a:schemeClr val="accent6">
+                    <a:lumMod val="75000"/>
+                  </a:schemeClr>
+                </a:solidFill>
+              </a:rPr>
+              <a:t>xsd:double</a:t>
+            </a:r>
+            <a:endParaRPr lang="it-IT" sz="1200" dirty="0">
+              <a:solidFill>
+                <a:schemeClr val="accent6">
+                  <a:lumMod val="75000"/>
+                </a:schemeClr>
+              </a:solidFill>
+            </a:endParaRPr>
+          </a:p>
+        </p:txBody>
+      </p:sp>
+      <p:sp>
+        <p:nvSpPr>
+          <p:cNvPr id="159" name="TextBox 158"/>
+          <p:cNvSpPr txBox="1"/>
+          <p:nvPr/>
+        </p:nvSpPr>
+        <p:spPr>
+          <a:xfrm>
+            <a:off x="1230790" y="2780928"/>
+            <a:ext cx="1362276" cy="276999"/>
+          </a:xfrm>
+          <a:prstGeom prst="rect">
+            <a:avLst/>
+          </a:prstGeom>
+          <a:noFill/>
+        </p:spPr>
+        <p:txBody>
+          <a:bodyPr wrap="square" rtlCol="0">
+            <a:spAutoFit/>
+          </a:bodyPr>
+          <a:lstStyle/>
+          <a:p>
+            <a:r>
+              <a:rPr lang="it-IT" sz="1200" dirty="0" err="1" smtClean="0"/>
+              <a:t>experienceInYears</a:t>
+            </a:r>
+            <a:endParaRPr lang="it-IT" sz="1200" dirty="0"/>
+          </a:p>
+        </p:txBody>
+      </p:sp>
+      <p:sp>
+        <p:nvSpPr>
+          <p:cNvPr id="165" name="TextBox 164"/>
+          <p:cNvSpPr txBox="1"/>
+          <p:nvPr/>
+        </p:nvSpPr>
+        <p:spPr>
+          <a:xfrm>
+            <a:off x="4393266" y="4941168"/>
+            <a:ext cx="1518495" cy="276999"/>
+          </a:xfrm>
+          <a:prstGeom prst="rect">
+            <a:avLst/>
+          </a:prstGeom>
+          <a:noFill/>
+        </p:spPr>
+        <p:txBody>
+          <a:bodyPr wrap="square" rtlCol="0">
+            <a:spAutoFit/>
+          </a:bodyPr>
+          <a:lstStyle/>
+          <a:p>
+            <a:r>
+              <a:rPr lang="it-IT" sz="1200" dirty="0" err="1" smtClean="0"/>
+              <a:t>externalProfileName</a:t>
+            </a:r>
+            <a:endParaRPr lang="it-IT" sz="1200" dirty="0" smtClean="0"/>
+          </a:p>
+        </p:txBody>
+      </p:sp>
+      <p:cxnSp>
+        <p:nvCxnSpPr>
+          <p:cNvPr id="166" name="Straight Arrow Connector 165"/>
+          <p:cNvCxnSpPr>
+            <a:stCxn id="38" idx="3"/>
+            <a:endCxn id="168" idx="1"/>
+          </p:cNvCxnSpPr>
+          <p:nvPr/>
+        </p:nvCxnSpPr>
+        <p:spPr>
+          <a:xfrm>
+            <a:off x="4683814" y="4706465"/>
+            <a:ext cx="1280012" cy="753568"/>
+          </a:xfrm>
+          <a:prstGeom prst="straightConnector1">
+            <a:avLst/>
+          </a:prstGeom>
+          <a:ln>
+            <a:tailEnd type="arrow"/>
+          </a:ln>
+        </p:spPr>
+        <p:style>
+          <a:lnRef idx="2">
+            <a:schemeClr val="dk1"/>
+          </a:lnRef>
+          <a:fillRef idx="0">
+            <a:schemeClr val="dk1"/>
+          </a:fillRef>
+          <a:effectRef idx="1">
+            <a:schemeClr val="dk1"/>
+          </a:effectRef>
+          <a:fontRef idx="minor">
+            <a:schemeClr val="tx1"/>
+          </a:fontRef>
+        </p:style>
+      </p:cxnSp>
+      <p:sp>
+        <p:nvSpPr>
+          <p:cNvPr id="168" name="TextBox 167"/>
+          <p:cNvSpPr txBox="1"/>
+          <p:nvPr/>
+        </p:nvSpPr>
+        <p:spPr>
+          <a:xfrm>
+            <a:off x="5963826" y="5229200"/>
+            <a:ext cx="1813816" cy="461665"/>
+          </a:xfrm>
+          <a:prstGeom prst="rect">
+            <a:avLst/>
+          </a:prstGeom>
+          <a:noFill/>
+        </p:spPr>
+        <p:txBody>
+          <a:bodyPr wrap="square" rtlCol="0">
+            <a:spAutoFit/>
+          </a:bodyPr>
+          <a:lstStyle/>
+          <a:p>
+            <a:r>
+              <a:rPr lang="it-IT" sz="1200" dirty="0" err="1" smtClean="0">
+                <a:solidFill>
+                  <a:schemeClr val="accent6">
+                    <a:lumMod val="75000"/>
+                  </a:schemeClr>
+                </a:solidFill>
+              </a:rPr>
+              <a:t>xsd:string</a:t>
+            </a:r>
+            <a:endParaRPr lang="it-IT" sz="1200" dirty="0" smtClean="0">
+              <a:solidFill>
+                <a:schemeClr val="accent6">
+                  <a:lumMod val="75000"/>
+                </a:schemeClr>
+              </a:solidFill>
+            </a:endParaRPr>
+          </a:p>
+          <a:p>
+            <a:r>
+              <a:rPr lang="it-IT" sz="1200" dirty="0" smtClean="0">
+                <a:solidFill>
+                  <a:schemeClr val="accent6">
+                    <a:lumMod val="75000"/>
+                  </a:schemeClr>
+                </a:solidFill>
+              </a:rPr>
+              <a:t>(ORCID, </a:t>
+            </a:r>
+            <a:r>
+              <a:rPr lang="it-IT" sz="1200" dirty="0" err="1" smtClean="0">
+                <a:solidFill>
+                  <a:schemeClr val="accent6">
+                    <a:lumMod val="75000"/>
+                  </a:schemeClr>
+                </a:solidFill>
+              </a:rPr>
+              <a:t>LinkedIn</a:t>
+            </a:r>
+            <a:r>
+              <a:rPr lang="it-IT" sz="1200" dirty="0" smtClean="0">
+                <a:solidFill>
+                  <a:schemeClr val="accent6">
+                    <a:lumMod val="75000"/>
+                  </a:schemeClr>
+                </a:solidFill>
+              </a:rPr>
+              <a:t>, etc.)</a:t>
+            </a:r>
+            <a:endParaRPr lang="it-IT" sz="1200" dirty="0">
+              <a:solidFill>
+                <a:schemeClr val="accent6">
+                  <a:lumMod val="75000"/>
+                </a:schemeClr>
+              </a:solidFill>
+            </a:endParaRPr>
+          </a:p>
+        </p:txBody>
+      </p:sp>
+      <p:cxnSp>
+        <p:nvCxnSpPr>
+          <p:cNvPr id="169" name="Straight Arrow Connector 168"/>
+          <p:cNvCxnSpPr>
+            <a:stCxn id="38" idx="3"/>
+            <a:endCxn id="175" idx="1"/>
+          </p:cNvCxnSpPr>
+          <p:nvPr/>
+        </p:nvCxnSpPr>
+        <p:spPr>
+          <a:xfrm>
+            <a:off x="4683814" y="4706465"/>
+            <a:ext cx="2033178" cy="301195"/>
+          </a:xfrm>
+          <a:prstGeom prst="straightConnector1">
+            <a:avLst/>
+          </a:prstGeom>
+          <a:ln>
+            <a:tailEnd type="arrow"/>
+          </a:ln>
+        </p:spPr>
+        <p:style>
+          <a:lnRef idx="2">
+            <a:schemeClr val="dk1"/>
+          </a:lnRef>
+          <a:fillRef idx="0">
+            <a:schemeClr val="dk1"/>
+          </a:fillRef>
+          <a:effectRef idx="1">
+            <a:schemeClr val="dk1"/>
+          </a:effectRef>
+          <a:fontRef idx="minor">
+            <a:schemeClr val="tx1"/>
+          </a:fontRef>
+        </p:style>
+      </p:cxnSp>
+      <p:sp>
+        <p:nvSpPr>
+          <p:cNvPr id="173" name="TextBox 172"/>
+          <p:cNvSpPr txBox="1"/>
+          <p:nvPr/>
+        </p:nvSpPr>
+        <p:spPr>
+          <a:xfrm>
+            <a:off x="5545394" y="4869160"/>
+            <a:ext cx="1465046" cy="276999"/>
+          </a:xfrm>
+          <a:prstGeom prst="rect">
+            <a:avLst/>
+          </a:prstGeom>
+          <a:noFill/>
+        </p:spPr>
+        <p:txBody>
+          <a:bodyPr wrap="square" rtlCol="0">
+            <a:spAutoFit/>
+          </a:bodyPr>
+          <a:lstStyle/>
+          <a:p>
+            <a:r>
+              <a:rPr lang="it-IT" sz="1200" dirty="0" err="1" smtClean="0"/>
+              <a:t>externalProfileUrl</a:t>
+            </a:r>
+            <a:endParaRPr lang="it-IT" sz="1200" dirty="0" smtClean="0"/>
+          </a:p>
+        </p:txBody>
+      </p:sp>
+      <p:sp>
+        <p:nvSpPr>
+          <p:cNvPr id="175" name="TextBox 174"/>
+          <p:cNvSpPr txBox="1"/>
+          <p:nvPr/>
+        </p:nvSpPr>
+        <p:spPr>
+          <a:xfrm>
+            <a:off x="6716992" y="4869160"/>
+            <a:ext cx="1060650" cy="276999"/>
+          </a:xfrm>
+          <a:prstGeom prst="rect">
+            <a:avLst/>
+          </a:prstGeom>
+          <a:noFill/>
+        </p:spPr>
+        <p:txBody>
+          <a:bodyPr wrap="square" rtlCol="0">
+            <a:spAutoFit/>
+          </a:bodyPr>
+          <a:lstStyle/>
+          <a:p>
+            <a:r>
+              <a:rPr lang="it-IT" sz="1200" dirty="0" err="1">
+                <a:solidFill>
+                  <a:schemeClr val="accent6">
+                    <a:lumMod val="75000"/>
+                  </a:schemeClr>
+                </a:solidFill>
+              </a:rPr>
+              <a:t>x</a:t>
+            </a:r>
+            <a:r>
+              <a:rPr lang="it-IT" sz="1200" dirty="0" err="1" smtClean="0">
+                <a:solidFill>
+                  <a:schemeClr val="accent6">
+                    <a:lumMod val="75000"/>
+                  </a:schemeClr>
+                </a:solidFill>
+              </a:rPr>
+              <a:t>sd:string</a:t>
+            </a:r>
+            <a:endParaRPr lang="it-IT" sz="1200" dirty="0" smtClean="0">
+              <a:solidFill>
+                <a:schemeClr val="accent6">
+                  <a:lumMod val="75000"/>
+                </a:schemeClr>
+              </a:solidFill>
+            </a:endParaRPr>
+          </a:p>
+        </p:txBody>
+      </p:sp>
+      <p:cxnSp>
+        <p:nvCxnSpPr>
+          <p:cNvPr id="176" name="Curved Connector 175"/>
+          <p:cNvCxnSpPr>
+            <a:stCxn id="99" idx="2"/>
+            <a:endCxn id="37" idx="1"/>
+          </p:cNvCxnSpPr>
+          <p:nvPr/>
+        </p:nvCxnSpPr>
+        <p:spPr>
+          <a:xfrm rot="16200000" flipH="1">
+            <a:off x="690522" y="2011832"/>
+            <a:ext cx="2429593" cy="1807544"/>
+          </a:xfrm>
+          <a:prstGeom prst="curvedConnector2">
+            <a:avLst/>
+          </a:prstGeom>
+          <a:ln>
+            <a:tailEnd type="arrow"/>
+          </a:ln>
+        </p:spPr>
+        <p:style>
+          <a:lnRef idx="2">
+            <a:schemeClr val="dk1"/>
+          </a:lnRef>
+          <a:fillRef idx="0">
+            <a:schemeClr val="dk1"/>
+          </a:fillRef>
+          <a:effectRef idx="1">
+            <a:schemeClr val="dk1"/>
+          </a:effectRef>
+          <a:fontRef idx="minor">
+            <a:schemeClr val="tx1"/>
+          </a:fontRef>
+        </p:style>
+      </p:cxnSp>
+      <p:cxnSp>
+        <p:nvCxnSpPr>
+          <p:cNvPr id="179" name="Curved Connector 178"/>
+          <p:cNvCxnSpPr>
+            <a:stCxn id="99" idx="2"/>
+            <a:endCxn id="38" idx="1"/>
+          </p:cNvCxnSpPr>
+          <p:nvPr/>
+        </p:nvCxnSpPr>
+        <p:spPr>
+          <a:xfrm rot="16200000" flipH="1">
+            <a:off x="402240" y="2300114"/>
+            <a:ext cx="3005657" cy="1807044"/>
+          </a:xfrm>
+          <a:prstGeom prst="curvedConnector2">
+            <a:avLst/>
+          </a:prstGeom>
+          <a:ln>
+            <a:tailEnd type="arrow"/>
+          </a:ln>
+        </p:spPr>
+        <p:style>
+          <a:lnRef idx="2">
+            <a:schemeClr val="dk1"/>
+          </a:lnRef>
+          <a:fillRef idx="0">
+            <a:schemeClr val="dk1"/>
+          </a:fillRef>
+          <a:effectRef idx="1">
+            <a:schemeClr val="dk1"/>
+          </a:effectRef>
+          <a:fontRef idx="minor">
+            <a:schemeClr val="tx1"/>
+          </a:fontRef>
+        </p:style>
+      </p:cxnSp>
+      <p:sp>
+        <p:nvSpPr>
+          <p:cNvPr id="182" name="TextBox 181"/>
+          <p:cNvSpPr txBox="1"/>
+          <p:nvPr/>
+        </p:nvSpPr>
+        <p:spPr>
+          <a:xfrm>
+            <a:off x="1584954" y="3728065"/>
+            <a:ext cx="1264404" cy="276999"/>
+          </a:xfrm>
+          <a:prstGeom prst="rect">
+            <a:avLst/>
+          </a:prstGeom>
+          <a:noFill/>
+        </p:spPr>
+        <p:txBody>
+          <a:bodyPr wrap="square" rtlCol="0">
+            <a:spAutoFit/>
+          </a:bodyPr>
+          <a:lstStyle/>
+          <a:p>
+            <a:r>
+              <a:rPr lang="it-IT" sz="1200" dirty="0" err="1" smtClean="0"/>
+              <a:t>hasCertification</a:t>
+            </a:r>
+            <a:endParaRPr lang="it-IT" sz="1200" dirty="0"/>
+          </a:p>
+        </p:txBody>
+      </p:sp>
+      <p:sp>
+        <p:nvSpPr>
+          <p:cNvPr id="183" name="TextBox 182"/>
+          <p:cNvSpPr txBox="1"/>
+          <p:nvPr/>
+        </p:nvSpPr>
+        <p:spPr>
+          <a:xfrm>
+            <a:off x="1472688" y="4269461"/>
+            <a:ext cx="1480418" cy="276999"/>
+          </a:xfrm>
+          <a:prstGeom prst="rect">
+            <a:avLst/>
+          </a:prstGeom>
+          <a:noFill/>
+        </p:spPr>
+        <p:txBody>
+          <a:bodyPr wrap="square" rtlCol="0">
+            <a:spAutoFit/>
+          </a:bodyPr>
+          <a:lstStyle/>
+          <a:p>
+            <a:r>
+              <a:rPr lang="it-IT" sz="1200" dirty="0" err="1" smtClean="0"/>
+              <a:t>hasExternalProfile</a:t>
+            </a:r>
+            <a:endParaRPr lang="it-IT" sz="1200" dirty="0"/>
+          </a:p>
+        </p:txBody>
+      </p:sp>
+      <p:cxnSp>
+        <p:nvCxnSpPr>
+          <p:cNvPr id="184" name="Curved Connector 183"/>
+          <p:cNvCxnSpPr>
+            <a:stCxn id="99" idx="2"/>
+            <a:endCxn id="191" idx="0"/>
+          </p:cNvCxnSpPr>
+          <p:nvPr/>
+        </p:nvCxnSpPr>
+        <p:spPr>
+          <a:xfrm rot="5400000">
+            <a:off x="-265761" y="2521733"/>
+            <a:ext cx="2088232" cy="446383"/>
+          </a:xfrm>
+          <a:prstGeom prst="curvedConnector3">
+            <a:avLst>
+              <a:gd name="adj1" fmla="val 50000"/>
+            </a:avLst>
+          </a:prstGeom>
+          <a:ln>
+            <a:tailEnd type="arrow"/>
+          </a:ln>
+        </p:spPr>
+        <p:style>
+          <a:lnRef idx="2">
+            <a:schemeClr val="dk1"/>
+          </a:lnRef>
+          <a:fillRef idx="0">
+            <a:schemeClr val="dk1"/>
+          </a:fillRef>
+          <a:effectRef idx="1">
+            <a:schemeClr val="dk1"/>
+          </a:effectRef>
+          <a:fontRef idx="minor">
+            <a:schemeClr val="tx1"/>
+          </a:fontRef>
+        </p:style>
+      </p:cxnSp>
+      <p:sp>
+        <p:nvSpPr>
+          <p:cNvPr id="185" name="TextBox 184"/>
+          <p:cNvSpPr txBox="1"/>
+          <p:nvPr/>
+        </p:nvSpPr>
+        <p:spPr>
+          <a:xfrm>
+            <a:off x="-60123" y="3440033"/>
+            <a:ext cx="1607787" cy="276999"/>
+          </a:xfrm>
+          <a:prstGeom prst="rect">
+            <a:avLst/>
+          </a:prstGeom>
+          <a:noFill/>
+        </p:spPr>
+        <p:txBody>
+          <a:bodyPr wrap="square" rtlCol="0">
+            <a:spAutoFit/>
+          </a:bodyPr>
+          <a:lstStyle/>
+          <a:p>
+            <a:r>
+              <a:rPr lang="it-IT" sz="1200" dirty="0" err="1" smtClean="0"/>
+              <a:t>yearsOnMarketPlace</a:t>
+            </a:r>
+            <a:endParaRPr lang="it-IT" sz="1200" dirty="0"/>
+          </a:p>
+        </p:txBody>
+      </p:sp>
+      <p:sp>
+        <p:nvSpPr>
+          <p:cNvPr id="191" name="TextBox 190"/>
+          <p:cNvSpPr txBox="1"/>
+          <p:nvPr/>
+        </p:nvSpPr>
+        <p:spPr>
+          <a:xfrm>
+            <a:off x="65540" y="3789040"/>
+            <a:ext cx="979246" cy="276999"/>
+          </a:xfrm>
+          <a:prstGeom prst="rect">
+            <a:avLst/>
+          </a:prstGeom>
+          <a:noFill/>
+        </p:spPr>
+        <p:txBody>
+          <a:bodyPr wrap="square" rtlCol="0">
+            <a:spAutoFit/>
+          </a:bodyPr>
+          <a:lstStyle/>
+          <a:p>
+            <a:r>
+              <a:rPr lang="it-IT" sz="1200" dirty="0" err="1" smtClean="0">
+                <a:solidFill>
+                  <a:schemeClr val="accent6">
+                    <a:lumMod val="75000"/>
+                  </a:schemeClr>
+                </a:solidFill>
+              </a:rPr>
+              <a:t>xsd:double</a:t>
+            </a:r>
+            <a:endParaRPr lang="it-IT" sz="1200" dirty="0">
+              <a:solidFill>
+                <a:schemeClr val="accent6">
+                  <a:lumMod val="75000"/>
+                </a:schemeClr>
+              </a:solidFill>
+            </a:endParaRPr>
+          </a:p>
+        </p:txBody>
+      </p:sp>
+      <p:cxnSp>
+        <p:nvCxnSpPr>
+          <p:cNvPr id="195" name="Straight Arrow Connector 194"/>
+          <p:cNvCxnSpPr>
+            <a:stCxn id="38" idx="3"/>
+            <a:endCxn id="146" idx="2"/>
+          </p:cNvCxnSpPr>
+          <p:nvPr/>
+        </p:nvCxnSpPr>
+        <p:spPr>
+          <a:xfrm flipV="1">
+            <a:off x="4683814" y="1479366"/>
+            <a:ext cx="3876275" cy="3227099"/>
+          </a:xfrm>
+          <a:prstGeom prst="straightConnector1">
+            <a:avLst/>
+          </a:prstGeom>
+          <a:ln>
+            <a:tailEnd type="arrow"/>
+          </a:ln>
+        </p:spPr>
+        <p:style>
+          <a:lnRef idx="2">
+            <a:schemeClr val="accent1"/>
+          </a:lnRef>
+          <a:fillRef idx="0">
+            <a:schemeClr val="accent1"/>
+          </a:fillRef>
+          <a:effectRef idx="1">
+            <a:schemeClr val="accent1"/>
+          </a:effectRef>
+          <a:fontRef idx="minor">
+            <a:schemeClr val="tx1"/>
+          </a:fontRef>
+        </p:style>
+      </p:cxnSp>
+      <p:cxnSp>
+        <p:nvCxnSpPr>
+          <p:cNvPr id="209" name="Straight Arrow Connector 208"/>
+          <p:cNvCxnSpPr>
+            <a:stCxn id="99" idx="2"/>
+            <a:endCxn id="36" idx="1"/>
+          </p:cNvCxnSpPr>
+          <p:nvPr/>
+        </p:nvCxnSpPr>
+        <p:spPr>
+          <a:xfrm>
+            <a:off x="1001546" y="1700808"/>
+            <a:ext cx="1804528" cy="1853529"/>
+          </a:xfrm>
+          <a:prstGeom prst="straightConnector1">
+            <a:avLst/>
+          </a:prstGeom>
+          <a:ln>
+            <a:tailEnd type="arrow"/>
+          </a:ln>
+        </p:spPr>
+        <p:style>
+          <a:lnRef idx="2">
+            <a:schemeClr val="dk1"/>
+          </a:lnRef>
+          <a:fillRef idx="0">
+            <a:schemeClr val="dk1"/>
+          </a:fillRef>
+          <a:effectRef idx="1">
+            <a:schemeClr val="dk1"/>
+          </a:effectRef>
+          <a:fontRef idx="minor">
+            <a:schemeClr val="tx1"/>
+          </a:fontRef>
+        </p:style>
+      </p:cxnSp>
+      <p:sp>
+        <p:nvSpPr>
+          <p:cNvPr id="212" name="TextBox 211"/>
+          <p:cNvSpPr txBox="1"/>
+          <p:nvPr/>
+        </p:nvSpPr>
+        <p:spPr>
+          <a:xfrm>
+            <a:off x="2090282" y="3077175"/>
+            <a:ext cx="792068" cy="276999"/>
+          </a:xfrm>
+          <a:prstGeom prst="rect">
+            <a:avLst/>
+          </a:prstGeom>
+          <a:noFill/>
+        </p:spPr>
+        <p:txBody>
+          <a:bodyPr wrap="square" rtlCol="0">
+            <a:spAutoFit/>
+          </a:bodyPr>
+          <a:lstStyle/>
+          <a:p>
+            <a:r>
+              <a:rPr lang="it-IT" sz="1200" dirty="0" err="1" smtClean="0"/>
+              <a:t>requests</a:t>
+            </a:r>
+            <a:endParaRPr lang="it-IT" sz="1200" dirty="0"/>
+          </a:p>
+        </p:txBody>
+      </p:sp>
+      <p:sp>
+        <p:nvSpPr>
+          <p:cNvPr id="75" name="Rounded Rectangle 74"/>
+          <p:cNvSpPr/>
+          <p:nvPr/>
+        </p:nvSpPr>
+        <p:spPr>
+          <a:xfrm>
+            <a:off x="2770070" y="5085184"/>
+            <a:ext cx="1875224" cy="394690"/>
+          </a:xfrm>
+          <a:prstGeom prst="roundRect">
+            <a:avLst/>
+          </a:prstGeom>
+        </p:spPr>
+        <p:style>
+          <a:lnRef idx="3">
+            <a:schemeClr val="lt1"/>
+          </a:lnRef>
+          <a:fillRef idx="1">
+            <a:schemeClr val="accent3"/>
+          </a:fillRef>
+          <a:effectRef idx="1">
+            <a:schemeClr val="accent3"/>
+          </a:effectRef>
+          <a:fontRef idx="minor">
+            <a:schemeClr val="lt1"/>
+          </a:fontRef>
+        </p:style>
+        <p:txBody>
+          <a:bodyPr rtlCol="0" anchor="ctr"/>
+          <a:lstStyle/>
+          <a:p>
+            <a:pPr algn="ctr"/>
+            <a:r>
+              <a:rPr lang="it-IT" dirty="0" err="1" smtClean="0"/>
+              <a:t>Contract</a:t>
+            </a:r>
+            <a:endParaRPr lang="it-IT" dirty="0"/>
+          </a:p>
+        </p:txBody>
+      </p:sp>
+      <p:cxnSp>
+        <p:nvCxnSpPr>
+          <p:cNvPr id="76" name="Straight Arrow Connector 75"/>
+          <p:cNvCxnSpPr>
+            <a:stCxn id="75" idx="3"/>
+          </p:cNvCxnSpPr>
+          <p:nvPr/>
+        </p:nvCxnSpPr>
+        <p:spPr>
+          <a:xfrm>
+            <a:off x="4645294" y="5282529"/>
+            <a:ext cx="808298" cy="362798"/>
+          </a:xfrm>
+          <a:prstGeom prst="straightConnector1">
+            <a:avLst/>
+          </a:prstGeom>
+          <a:ln>
+            <a:tailEnd type="arrow"/>
+          </a:ln>
+        </p:spPr>
+        <p:style>
+          <a:lnRef idx="2">
+            <a:schemeClr val="dk1"/>
+          </a:lnRef>
+          <a:fillRef idx="0">
+            <a:schemeClr val="dk1"/>
+          </a:fillRef>
+          <a:effectRef idx="1">
+            <a:schemeClr val="dk1"/>
+          </a:effectRef>
+          <a:fontRef idx="minor">
+            <a:schemeClr val="tx1"/>
+          </a:fontRef>
+        </p:style>
+      </p:cxnSp>
+      <p:sp>
+        <p:nvSpPr>
+          <p:cNvPr id="79" name="TextBox 78"/>
+          <p:cNvSpPr txBox="1"/>
+          <p:nvPr/>
+        </p:nvSpPr>
+        <p:spPr>
+          <a:xfrm>
+            <a:off x="4883724" y="5321532"/>
+            <a:ext cx="1021710" cy="276999"/>
+          </a:xfrm>
+          <a:prstGeom prst="rect">
+            <a:avLst/>
+          </a:prstGeom>
+          <a:noFill/>
+        </p:spPr>
+        <p:txBody>
+          <a:bodyPr wrap="square" rtlCol="0">
+            <a:spAutoFit/>
+          </a:bodyPr>
+          <a:lstStyle/>
+          <a:p>
+            <a:r>
+              <a:rPr lang="it-IT" sz="1200" dirty="0" err="1" smtClean="0"/>
+              <a:t>contractType</a:t>
+            </a:r>
+            <a:endParaRPr lang="it-IT" sz="1200" dirty="0" smtClean="0"/>
+          </a:p>
+        </p:txBody>
+      </p:sp>
+      <p:sp>
+        <p:nvSpPr>
+          <p:cNvPr id="80" name="TextBox 79"/>
+          <p:cNvSpPr txBox="1"/>
+          <p:nvPr/>
+        </p:nvSpPr>
+        <p:spPr>
+          <a:xfrm>
+            <a:off x="5459770" y="5612432"/>
+            <a:ext cx="1813816" cy="461665"/>
+          </a:xfrm>
+          <a:prstGeom prst="rect">
+            <a:avLst/>
+          </a:prstGeom>
+          <a:noFill/>
+        </p:spPr>
+        <p:txBody>
+          <a:bodyPr wrap="square" rtlCol="0">
+            <a:spAutoFit/>
+          </a:bodyPr>
+          <a:lstStyle/>
+          <a:p>
+            <a:r>
+              <a:rPr lang="it-IT" sz="1200" dirty="0" err="1" smtClean="0">
+                <a:solidFill>
+                  <a:schemeClr val="accent6">
+                    <a:lumMod val="75000"/>
+                  </a:schemeClr>
+                </a:solidFill>
+              </a:rPr>
+              <a:t>xsd:string</a:t>
+            </a:r>
+            <a:endParaRPr lang="it-IT" sz="1200" dirty="0" smtClean="0">
+              <a:solidFill>
+                <a:schemeClr val="accent6">
+                  <a:lumMod val="75000"/>
+                </a:schemeClr>
+              </a:solidFill>
+            </a:endParaRPr>
+          </a:p>
+          <a:p>
+            <a:r>
+              <a:rPr lang="it-IT" sz="1200" dirty="0" smtClean="0">
+                <a:solidFill>
+                  <a:schemeClr val="accent6">
+                    <a:lumMod val="75000"/>
+                  </a:schemeClr>
+                </a:solidFill>
+              </a:rPr>
+              <a:t>(full-time, part-time, etc.)</a:t>
+            </a:r>
+            <a:endParaRPr lang="it-IT" sz="1200" dirty="0">
+              <a:solidFill>
+                <a:schemeClr val="accent6">
+                  <a:lumMod val="75000"/>
+                </a:schemeClr>
+              </a:solidFill>
+            </a:endParaRPr>
+          </a:p>
+        </p:txBody>
+      </p:sp>
+      <p:cxnSp>
+        <p:nvCxnSpPr>
+          <p:cNvPr id="81" name="Straight Arrow Connector 80"/>
+          <p:cNvCxnSpPr>
+            <a:stCxn id="75" idx="3"/>
+          </p:cNvCxnSpPr>
+          <p:nvPr/>
+        </p:nvCxnSpPr>
+        <p:spPr>
+          <a:xfrm>
+            <a:off x="4645294" y="5282529"/>
+            <a:ext cx="903036" cy="1008112"/>
+          </a:xfrm>
+          <a:prstGeom prst="straightConnector1">
+            <a:avLst/>
+          </a:prstGeom>
+          <a:ln>
+            <a:tailEnd type="arrow"/>
+          </a:ln>
+        </p:spPr>
+        <p:style>
+          <a:lnRef idx="2">
+            <a:schemeClr val="dk1"/>
+          </a:lnRef>
+          <a:fillRef idx="0">
+            <a:schemeClr val="dk1"/>
+          </a:fillRef>
+          <a:effectRef idx="1">
+            <a:schemeClr val="dk1"/>
+          </a:effectRef>
+          <a:fontRef idx="minor">
+            <a:schemeClr val="tx1"/>
+          </a:fontRef>
+        </p:style>
+      </p:cxnSp>
+      <p:sp>
+        <p:nvSpPr>
+          <p:cNvPr id="84" name="TextBox 83"/>
+          <p:cNvSpPr txBox="1"/>
+          <p:nvPr/>
+        </p:nvSpPr>
+        <p:spPr>
+          <a:xfrm>
+            <a:off x="4537282" y="5949280"/>
+            <a:ext cx="1569743" cy="276999"/>
+          </a:xfrm>
+          <a:prstGeom prst="rect">
+            <a:avLst/>
+          </a:prstGeom>
+          <a:noFill/>
+        </p:spPr>
+        <p:txBody>
+          <a:bodyPr wrap="square" rtlCol="0">
+            <a:spAutoFit/>
+          </a:bodyPr>
+          <a:lstStyle/>
+          <a:p>
+            <a:r>
+              <a:rPr lang="it-IT" sz="1200" dirty="0" err="1" smtClean="0"/>
+              <a:t>contractConstraint</a:t>
+            </a:r>
+            <a:endParaRPr lang="it-IT" sz="1200" dirty="0" smtClean="0"/>
+          </a:p>
+        </p:txBody>
+      </p:sp>
+      <p:sp>
+        <p:nvSpPr>
+          <p:cNvPr id="85" name="TextBox 84"/>
+          <p:cNvSpPr txBox="1"/>
+          <p:nvPr/>
+        </p:nvSpPr>
+        <p:spPr>
+          <a:xfrm>
+            <a:off x="5303134" y="6309320"/>
+            <a:ext cx="1034348" cy="276999"/>
+          </a:xfrm>
+          <a:prstGeom prst="rect">
+            <a:avLst/>
+          </a:prstGeom>
+          <a:noFill/>
+        </p:spPr>
+        <p:txBody>
+          <a:bodyPr wrap="square" rtlCol="0">
+            <a:spAutoFit/>
+          </a:bodyPr>
+          <a:lstStyle/>
+          <a:p>
+            <a:r>
+              <a:rPr lang="it-IT" sz="1200" dirty="0" err="1" smtClean="0">
+                <a:solidFill>
+                  <a:schemeClr val="accent6">
+                    <a:lumMod val="75000"/>
+                  </a:schemeClr>
+                </a:solidFill>
+              </a:rPr>
+              <a:t>xsd:string</a:t>
+            </a:r>
+            <a:endParaRPr lang="it-IT" sz="1200" dirty="0" smtClean="0">
+              <a:solidFill>
+                <a:schemeClr val="accent6">
+                  <a:lumMod val="75000"/>
+                </a:schemeClr>
+              </a:solidFill>
+            </a:endParaRPr>
+          </a:p>
+        </p:txBody>
+      </p:sp>
+      <p:sp>
+        <p:nvSpPr>
+          <p:cNvPr id="91" name="Rounded Rectangle 90"/>
+          <p:cNvSpPr/>
+          <p:nvPr/>
+        </p:nvSpPr>
+        <p:spPr>
+          <a:xfrm>
+            <a:off x="5383592" y="3362897"/>
+            <a:ext cx="1693547" cy="394690"/>
+          </a:xfrm>
+          <a:prstGeom prst="roundRect">
+            <a:avLst/>
+          </a:prstGeom>
+        </p:spPr>
+        <p:style>
+          <a:lnRef idx="3">
+            <a:schemeClr val="lt1"/>
+          </a:lnRef>
+          <a:fillRef idx="1">
+            <a:schemeClr val="accent3"/>
+          </a:fillRef>
+          <a:effectRef idx="1">
+            <a:schemeClr val="accent3"/>
+          </a:effectRef>
+          <a:fontRef idx="minor">
+            <a:schemeClr val="lt1"/>
+          </a:fontRef>
+        </p:style>
+        <p:txBody>
+          <a:bodyPr rtlCol="0" anchor="ctr"/>
+          <a:lstStyle/>
+          <a:p>
+            <a:pPr algn="ctr"/>
+            <a:r>
+              <a:rPr lang="it-IT" dirty="0" err="1" smtClean="0"/>
+              <a:t>Remuneration</a:t>
+            </a:r>
+            <a:endParaRPr lang="it-IT" dirty="0"/>
+          </a:p>
+        </p:txBody>
+      </p:sp>
+      <p:cxnSp>
+        <p:nvCxnSpPr>
+          <p:cNvPr id="94" name="Straight Arrow Connector 93"/>
+          <p:cNvCxnSpPr>
+            <a:stCxn id="91" idx="0"/>
+            <a:endCxn id="101" idx="2"/>
+          </p:cNvCxnSpPr>
+          <p:nvPr/>
+        </p:nvCxnSpPr>
+        <p:spPr>
+          <a:xfrm flipV="1">
+            <a:off x="6230366" y="3129935"/>
+            <a:ext cx="2137773" cy="232962"/>
+          </a:xfrm>
+          <a:prstGeom prst="straightConnector1">
+            <a:avLst/>
+          </a:prstGeom>
+          <a:ln>
+            <a:tailEnd type="arrow"/>
+          </a:ln>
+        </p:spPr>
+        <p:style>
+          <a:lnRef idx="2">
+            <a:schemeClr val="dk1"/>
+          </a:lnRef>
+          <a:fillRef idx="0">
+            <a:schemeClr val="dk1"/>
+          </a:fillRef>
+          <a:effectRef idx="1">
+            <a:schemeClr val="dk1"/>
+          </a:effectRef>
+          <a:fontRef idx="minor">
+            <a:schemeClr val="tx1"/>
+          </a:fontRef>
+        </p:style>
+      </p:cxnSp>
+      <p:sp>
+        <p:nvSpPr>
+          <p:cNvPr id="98" name="TextBox 97"/>
+          <p:cNvSpPr txBox="1"/>
+          <p:nvPr/>
+        </p:nvSpPr>
+        <p:spPr>
+          <a:xfrm>
+            <a:off x="7327338" y="3152001"/>
+            <a:ext cx="1386408" cy="276999"/>
+          </a:xfrm>
+          <a:prstGeom prst="rect">
+            <a:avLst/>
+          </a:prstGeom>
+          <a:noFill/>
+        </p:spPr>
+        <p:txBody>
+          <a:bodyPr wrap="square" rtlCol="0">
+            <a:spAutoFit/>
+          </a:bodyPr>
+          <a:lstStyle/>
+          <a:p>
+            <a:r>
+              <a:rPr lang="it-IT" sz="1200" dirty="0" err="1" smtClean="0"/>
+              <a:t>remunerationvalue</a:t>
+            </a:r>
+            <a:endParaRPr lang="it-IT" sz="1200" dirty="0" smtClean="0"/>
+          </a:p>
+        </p:txBody>
+      </p:sp>
+      <p:sp>
+        <p:nvSpPr>
+          <p:cNvPr id="108" name="TextBox 107"/>
+          <p:cNvSpPr txBox="1"/>
+          <p:nvPr/>
+        </p:nvSpPr>
+        <p:spPr>
+          <a:xfrm>
+            <a:off x="6265474" y="2996952"/>
+            <a:ext cx="1759984" cy="276999"/>
+          </a:xfrm>
+          <a:prstGeom prst="rect">
+            <a:avLst/>
+          </a:prstGeom>
+          <a:noFill/>
+        </p:spPr>
+        <p:txBody>
+          <a:bodyPr wrap="square" rtlCol="0">
+            <a:spAutoFit/>
+          </a:bodyPr>
+          <a:lstStyle/>
+          <a:p>
+            <a:r>
+              <a:rPr lang="it-IT" sz="1200" dirty="0" err="1" smtClean="0"/>
+              <a:t>remunerationCurrency</a:t>
+            </a:r>
+            <a:endParaRPr lang="it-IT" sz="1200" dirty="0" smtClean="0"/>
+          </a:p>
+        </p:txBody>
+      </p:sp>
+      <p:cxnSp>
+        <p:nvCxnSpPr>
+          <p:cNvPr id="114" name="Straight Arrow Connector 113"/>
+          <p:cNvCxnSpPr>
+            <a:stCxn id="91" idx="0"/>
+            <a:endCxn id="125" idx="2"/>
+          </p:cNvCxnSpPr>
+          <p:nvPr/>
+        </p:nvCxnSpPr>
+        <p:spPr>
+          <a:xfrm flipV="1">
+            <a:off x="6230366" y="2985919"/>
+            <a:ext cx="1489701" cy="376978"/>
+          </a:xfrm>
+          <a:prstGeom prst="straightConnector1">
+            <a:avLst/>
+          </a:prstGeom>
+          <a:ln>
+            <a:tailEnd type="arrow"/>
+          </a:ln>
+        </p:spPr>
+        <p:style>
+          <a:lnRef idx="2">
+            <a:schemeClr val="dk1"/>
+          </a:lnRef>
+          <a:fillRef idx="0">
+            <a:schemeClr val="dk1"/>
+          </a:fillRef>
+          <a:effectRef idx="1">
+            <a:schemeClr val="dk1"/>
+          </a:effectRef>
+          <a:fontRef idx="minor">
+            <a:schemeClr val="tx1"/>
+          </a:fontRef>
+        </p:style>
+      </p:cxnSp>
+      <p:sp>
+        <p:nvSpPr>
+          <p:cNvPr id="115" name="TextBox 114"/>
+          <p:cNvSpPr txBox="1"/>
+          <p:nvPr/>
+        </p:nvSpPr>
+        <p:spPr>
+          <a:xfrm>
+            <a:off x="8316416" y="1700807"/>
+            <a:ext cx="979246" cy="276999"/>
+          </a:xfrm>
+          <a:prstGeom prst="rect">
+            <a:avLst/>
+          </a:prstGeom>
+          <a:noFill/>
+        </p:spPr>
+        <p:txBody>
+          <a:bodyPr wrap="square" rtlCol="0">
+            <a:spAutoFit/>
+          </a:bodyPr>
+          <a:lstStyle/>
+          <a:p>
+            <a:r>
+              <a:rPr lang="it-IT" sz="1200" dirty="0" err="1" smtClean="0">
+                <a:solidFill>
+                  <a:schemeClr val="accent6">
+                    <a:lumMod val="75000"/>
+                  </a:schemeClr>
+                </a:solidFill>
+              </a:rPr>
+              <a:t>xsd:string</a:t>
+            </a:r>
+            <a:endParaRPr lang="it-IT" sz="1200" dirty="0">
+              <a:solidFill>
+                <a:schemeClr val="accent6">
+                  <a:lumMod val="75000"/>
+                </a:schemeClr>
+              </a:solidFill>
+            </a:endParaRPr>
+          </a:p>
+        </p:txBody>
+      </p:sp>
+      <p:cxnSp>
+        <p:nvCxnSpPr>
+          <p:cNvPr id="117" name="Curved Connector 116"/>
+          <p:cNvCxnSpPr>
+            <a:stCxn id="75" idx="3"/>
+            <a:endCxn id="91" idx="3"/>
+          </p:cNvCxnSpPr>
+          <p:nvPr/>
+        </p:nvCxnSpPr>
+        <p:spPr>
+          <a:xfrm flipV="1">
+            <a:off x="4645294" y="3560242"/>
+            <a:ext cx="2431845" cy="1722287"/>
+          </a:xfrm>
+          <a:prstGeom prst="curvedConnector3">
+            <a:avLst>
+              <a:gd name="adj1" fmla="val 109400"/>
+            </a:avLst>
+          </a:prstGeom>
+          <a:ln>
+            <a:tailEnd type="arrow"/>
+          </a:ln>
+        </p:spPr>
+        <p:style>
+          <a:lnRef idx="2">
+            <a:schemeClr val="dk1"/>
+          </a:lnRef>
+          <a:fillRef idx="0">
+            <a:schemeClr val="dk1"/>
+          </a:fillRef>
+          <a:effectRef idx="1">
+            <a:schemeClr val="dk1"/>
+          </a:effectRef>
+          <a:fontRef idx="minor">
+            <a:schemeClr val="tx1"/>
+          </a:fontRef>
+        </p:style>
+      </p:cxnSp>
+      <p:sp>
+        <p:nvSpPr>
+          <p:cNvPr id="118" name="TextBox 117"/>
+          <p:cNvSpPr txBox="1"/>
+          <p:nvPr/>
+        </p:nvSpPr>
+        <p:spPr>
+          <a:xfrm>
+            <a:off x="6985554" y="5002143"/>
+            <a:ext cx="1302417" cy="276999"/>
+          </a:xfrm>
+          <a:prstGeom prst="rect">
+            <a:avLst/>
+          </a:prstGeom>
+          <a:noFill/>
+        </p:spPr>
+        <p:txBody>
+          <a:bodyPr wrap="square" rtlCol="0">
+            <a:spAutoFit/>
+          </a:bodyPr>
+          <a:lstStyle/>
+          <a:p>
+            <a:r>
+              <a:rPr lang="it-IT" sz="1200" dirty="0" err="1" smtClean="0"/>
+              <a:t>hasRemuneration</a:t>
+            </a:r>
+            <a:endParaRPr lang="it-IT" sz="1200" dirty="0" smtClean="0"/>
+          </a:p>
+        </p:txBody>
+      </p:sp>
+      <p:cxnSp>
+        <p:nvCxnSpPr>
+          <p:cNvPr id="120" name="Curved Connector 119"/>
+          <p:cNvCxnSpPr>
+            <a:stCxn id="99" idx="2"/>
+            <a:endCxn id="75" idx="1"/>
+          </p:cNvCxnSpPr>
+          <p:nvPr/>
+        </p:nvCxnSpPr>
+        <p:spPr>
+          <a:xfrm rot="16200000" flipH="1">
+            <a:off x="94948" y="2607406"/>
+            <a:ext cx="3581721" cy="1768524"/>
+          </a:xfrm>
+          <a:prstGeom prst="curvedConnector2">
+            <a:avLst/>
+          </a:prstGeom>
+          <a:ln>
+            <a:tailEnd type="arrow"/>
+          </a:ln>
+        </p:spPr>
+        <p:style>
+          <a:lnRef idx="2">
+            <a:schemeClr val="dk1"/>
+          </a:lnRef>
+          <a:fillRef idx="0">
+            <a:schemeClr val="dk1"/>
+          </a:fillRef>
+          <a:effectRef idx="1">
+            <a:schemeClr val="dk1"/>
+          </a:effectRef>
+          <a:fontRef idx="minor">
+            <a:schemeClr val="tx1"/>
+          </a:fontRef>
+        </p:style>
+      </p:cxnSp>
+      <p:sp>
+        <p:nvSpPr>
+          <p:cNvPr id="121" name="TextBox 120"/>
+          <p:cNvSpPr txBox="1"/>
+          <p:nvPr/>
+        </p:nvSpPr>
+        <p:spPr>
+          <a:xfrm>
+            <a:off x="1544686" y="5013176"/>
+            <a:ext cx="1264404" cy="276999"/>
+          </a:xfrm>
+          <a:prstGeom prst="rect">
+            <a:avLst/>
+          </a:prstGeom>
+          <a:noFill/>
+        </p:spPr>
+        <p:txBody>
+          <a:bodyPr wrap="square" rtlCol="0">
+            <a:spAutoFit/>
+          </a:bodyPr>
+          <a:lstStyle/>
+          <a:p>
+            <a:r>
+              <a:rPr lang="it-IT" sz="1200" dirty="0" err="1" smtClean="0"/>
+              <a:t>isUnderContract</a:t>
+            </a:r>
+            <a:endParaRPr lang="it-IT" sz="1200" dirty="0"/>
+          </a:p>
+        </p:txBody>
+      </p:sp>
+      <p:cxnSp>
+        <p:nvCxnSpPr>
+          <p:cNvPr id="123" name="Straight Arrow Connector 122"/>
+          <p:cNvCxnSpPr>
+            <a:stCxn id="42" idx="0"/>
+            <a:endCxn id="115" idx="2"/>
+          </p:cNvCxnSpPr>
+          <p:nvPr/>
+        </p:nvCxnSpPr>
+        <p:spPr>
+          <a:xfrm flipV="1">
+            <a:off x="6121458" y="1977806"/>
+            <a:ext cx="2684581" cy="287881"/>
+          </a:xfrm>
+          <a:prstGeom prst="straightConnector1">
+            <a:avLst/>
+          </a:prstGeom>
+          <a:ln>
+            <a:tailEnd type="arrow"/>
+          </a:ln>
+        </p:spPr>
+        <p:style>
+          <a:lnRef idx="2">
+            <a:schemeClr val="dk1"/>
+          </a:lnRef>
+          <a:fillRef idx="0">
+            <a:schemeClr val="dk1"/>
+          </a:fillRef>
+          <a:effectRef idx="1">
+            <a:schemeClr val="dk1"/>
+          </a:effectRef>
+          <a:fontRef idx="minor">
+            <a:schemeClr val="tx1"/>
+          </a:fontRef>
+        </p:style>
+      </p:cxnSp>
+      <p:sp>
+        <p:nvSpPr>
+          <p:cNvPr id="125" name="TextBox 124"/>
+          <p:cNvSpPr txBox="1"/>
+          <p:nvPr/>
+        </p:nvSpPr>
+        <p:spPr>
+          <a:xfrm>
+            <a:off x="7230444" y="2708920"/>
+            <a:ext cx="979246" cy="276999"/>
+          </a:xfrm>
+          <a:prstGeom prst="rect">
+            <a:avLst/>
+          </a:prstGeom>
+          <a:noFill/>
+        </p:spPr>
+        <p:txBody>
+          <a:bodyPr wrap="square" rtlCol="0">
+            <a:spAutoFit/>
+          </a:bodyPr>
+          <a:lstStyle/>
+          <a:p>
+            <a:r>
+              <a:rPr lang="it-IT" sz="1200" dirty="0" err="1" smtClean="0">
+                <a:solidFill>
+                  <a:schemeClr val="accent6">
+                    <a:lumMod val="75000"/>
+                  </a:schemeClr>
+                </a:solidFill>
+              </a:rPr>
+              <a:t>xsd:string</a:t>
+            </a:r>
+            <a:endParaRPr lang="it-IT" sz="1200" dirty="0">
+              <a:solidFill>
+                <a:schemeClr val="accent6">
+                  <a:lumMod val="75000"/>
+                </a:schemeClr>
+              </a:solidFill>
+            </a:endParaRPr>
+          </a:p>
+        </p:txBody>
+      </p:sp>
+      <p:sp>
+        <p:nvSpPr>
+          <p:cNvPr id="126" name="TextBox 125"/>
+          <p:cNvSpPr txBox="1"/>
+          <p:nvPr/>
+        </p:nvSpPr>
+        <p:spPr>
+          <a:xfrm>
+            <a:off x="7561618" y="1855857"/>
+            <a:ext cx="927680" cy="276999"/>
+          </a:xfrm>
+          <a:prstGeom prst="rect">
+            <a:avLst/>
+          </a:prstGeom>
+          <a:noFill/>
+        </p:spPr>
+        <p:txBody>
+          <a:bodyPr wrap="square" rtlCol="0">
+            <a:spAutoFit/>
+          </a:bodyPr>
+          <a:lstStyle/>
+          <a:p>
+            <a:r>
+              <a:rPr lang="it-IT" sz="1200" dirty="0" err="1"/>
+              <a:t>a</a:t>
+            </a:r>
+            <a:r>
+              <a:rPr lang="it-IT" sz="1200" dirty="0" err="1" smtClean="0"/>
+              <a:t>ddress</a:t>
+            </a:r>
+            <a:r>
+              <a:rPr lang="it-IT" sz="1200" dirty="0" smtClean="0"/>
+              <a:t>…</a:t>
+            </a:r>
+          </a:p>
+        </p:txBody>
+      </p:sp>
+      <p:sp>
+        <p:nvSpPr>
+          <p:cNvPr id="128" name="TextBox 127"/>
+          <p:cNvSpPr txBox="1"/>
+          <p:nvPr/>
+        </p:nvSpPr>
+        <p:spPr>
+          <a:xfrm>
+            <a:off x="6985554" y="4437112"/>
+            <a:ext cx="1944216" cy="276999"/>
+          </a:xfrm>
+          <a:prstGeom prst="rect">
+            <a:avLst/>
+          </a:prstGeom>
+          <a:noFill/>
+        </p:spPr>
+        <p:txBody>
+          <a:bodyPr wrap="square" rtlCol="0">
+            <a:spAutoFit/>
+          </a:bodyPr>
+          <a:lstStyle/>
+          <a:p>
+            <a:r>
+              <a:rPr lang="it-IT" sz="1200" dirty="0" err="1" smtClean="0"/>
+              <a:t>certificationAuthorityName</a:t>
+            </a:r>
+            <a:endParaRPr lang="it-IT" sz="1200" dirty="0"/>
+          </a:p>
+        </p:txBody>
+      </p:sp>
+      <p:cxnSp>
+        <p:nvCxnSpPr>
+          <p:cNvPr id="129" name="Straight Arrow Connector 128"/>
+          <p:cNvCxnSpPr>
+            <a:stCxn id="122" idx="3"/>
+            <a:endCxn id="130" idx="0"/>
+          </p:cNvCxnSpPr>
+          <p:nvPr/>
+        </p:nvCxnSpPr>
+        <p:spPr>
+          <a:xfrm>
+            <a:off x="8020542" y="4527799"/>
+            <a:ext cx="563621" cy="280386"/>
+          </a:xfrm>
+          <a:prstGeom prst="straightConnector1">
+            <a:avLst/>
+          </a:prstGeom>
+          <a:ln>
+            <a:tailEnd type="arrow"/>
+          </a:ln>
+        </p:spPr>
+        <p:style>
+          <a:lnRef idx="2">
+            <a:schemeClr val="dk1"/>
+          </a:lnRef>
+          <a:fillRef idx="0">
+            <a:schemeClr val="dk1"/>
+          </a:fillRef>
+          <a:effectRef idx="1">
+            <a:schemeClr val="dk1"/>
+          </a:effectRef>
+          <a:fontRef idx="minor">
+            <a:schemeClr val="tx1"/>
+          </a:fontRef>
+        </p:style>
+      </p:cxnSp>
+      <p:sp>
+        <p:nvSpPr>
+          <p:cNvPr id="130" name="TextBox 129"/>
+          <p:cNvSpPr txBox="1"/>
+          <p:nvPr/>
+        </p:nvSpPr>
+        <p:spPr>
+          <a:xfrm>
+            <a:off x="8094540" y="4808185"/>
+            <a:ext cx="979246" cy="276999"/>
+          </a:xfrm>
+          <a:prstGeom prst="rect">
+            <a:avLst/>
+          </a:prstGeom>
+          <a:noFill/>
+        </p:spPr>
+        <p:txBody>
+          <a:bodyPr wrap="square" rtlCol="0">
+            <a:spAutoFit/>
+          </a:bodyPr>
+          <a:lstStyle/>
+          <a:p>
+            <a:r>
+              <a:rPr lang="it-IT" sz="1200" dirty="0" err="1" smtClean="0">
+                <a:solidFill>
+                  <a:schemeClr val="accent6">
+                    <a:lumMod val="75000"/>
+                  </a:schemeClr>
+                </a:solidFill>
+              </a:rPr>
+              <a:t>xsd:string</a:t>
+            </a:r>
+            <a:endParaRPr lang="it-IT" sz="1200" dirty="0">
+              <a:solidFill>
+                <a:schemeClr val="accent6">
+                  <a:lumMod val="75000"/>
+                </a:schemeClr>
+              </a:solidFill>
+            </a:endParaRPr>
+          </a:p>
+        </p:txBody>
+      </p:sp>
+      <p:sp>
+        <p:nvSpPr>
+          <p:cNvPr id="131" name="Rounded Rectangle 130"/>
+          <p:cNvSpPr/>
+          <p:nvPr/>
+        </p:nvSpPr>
+        <p:spPr>
+          <a:xfrm>
+            <a:off x="2490286" y="5882788"/>
+            <a:ext cx="1440160" cy="394690"/>
+          </a:xfrm>
+          <a:prstGeom prst="roundRect">
+            <a:avLst/>
+          </a:prstGeom>
+        </p:spPr>
+        <p:style>
+          <a:lnRef idx="3">
+            <a:schemeClr val="lt1"/>
+          </a:lnRef>
+          <a:fillRef idx="1">
+            <a:schemeClr val="accent3"/>
+          </a:fillRef>
+          <a:effectRef idx="1">
+            <a:schemeClr val="accent3"/>
+          </a:effectRef>
+          <a:fontRef idx="minor">
+            <a:schemeClr val="lt1"/>
+          </a:fontRef>
+        </p:style>
+        <p:txBody>
+          <a:bodyPr rtlCol="0" anchor="ctr"/>
+          <a:lstStyle/>
+          <a:p>
+            <a:pPr algn="ctr"/>
+            <a:r>
+              <a:rPr lang="it-IT" dirty="0" smtClean="0"/>
+              <a:t>Activity (?)</a:t>
+            </a:r>
+            <a:endParaRPr lang="it-IT" dirty="0"/>
+          </a:p>
+        </p:txBody>
+      </p:sp>
+      <p:cxnSp>
+        <p:nvCxnSpPr>
+          <p:cNvPr id="133" name="Straight Arrow Connector 132"/>
+          <p:cNvCxnSpPr>
+            <a:stCxn id="104" idx="2"/>
+            <a:endCxn id="137" idx="0"/>
+          </p:cNvCxnSpPr>
+          <p:nvPr/>
+        </p:nvCxnSpPr>
+        <p:spPr>
+          <a:xfrm flipH="1">
+            <a:off x="1544686" y="1948293"/>
+            <a:ext cx="1984485" cy="4326377"/>
+          </a:xfrm>
+          <a:prstGeom prst="straightConnector1">
+            <a:avLst/>
+          </a:prstGeom>
+          <a:ln>
+            <a:tailEnd type="arrow"/>
+          </a:ln>
+        </p:spPr>
+        <p:style>
+          <a:lnRef idx="2">
+            <a:schemeClr val="dk1"/>
+          </a:lnRef>
+          <a:fillRef idx="0">
+            <a:schemeClr val="dk1"/>
+          </a:fillRef>
+          <a:effectRef idx="1">
+            <a:schemeClr val="dk1"/>
+          </a:effectRef>
+          <a:fontRef idx="minor">
+            <a:schemeClr val="tx1"/>
+          </a:fontRef>
+        </p:style>
+      </p:cxnSp>
+      <p:sp>
+        <p:nvSpPr>
+          <p:cNvPr id="137" name="Rounded Rectangle 136"/>
+          <p:cNvSpPr/>
+          <p:nvPr/>
+        </p:nvSpPr>
+        <p:spPr>
+          <a:xfrm>
+            <a:off x="931110" y="6274670"/>
+            <a:ext cx="1227152" cy="394690"/>
+          </a:xfrm>
+          <a:prstGeom prst="roundRect">
+            <a:avLst/>
+          </a:prstGeom>
+        </p:spPr>
+        <p:style>
+          <a:lnRef idx="2">
+            <a:schemeClr val="accent1">
+              <a:shade val="50000"/>
+            </a:schemeClr>
+          </a:lnRef>
+          <a:fillRef idx="1">
+            <a:schemeClr val="accent1"/>
+          </a:fillRef>
+          <a:effectRef idx="0">
+            <a:schemeClr val="accent1"/>
+          </a:effectRef>
+          <a:fontRef idx="minor">
+            <a:schemeClr val="lt1"/>
+          </a:fontRef>
+        </p:style>
+        <p:txBody>
+          <a:bodyPr rtlCol="0" anchor="ctr"/>
+          <a:lstStyle/>
+          <a:p>
+            <a:pPr algn="ctr"/>
+            <a:r>
+              <a:rPr lang="it-IT" dirty="0" err="1"/>
+              <a:t>Sign</a:t>
+            </a:r>
+            <a:endParaRPr lang="it-IT" dirty="0"/>
+          </a:p>
+        </p:txBody>
+      </p:sp>
+      <p:sp>
+        <p:nvSpPr>
+          <p:cNvPr id="134" name="Rounded Rectangle 133"/>
+          <p:cNvSpPr/>
+          <p:nvPr/>
+        </p:nvSpPr>
+        <p:spPr>
+          <a:xfrm>
+            <a:off x="6392757" y="55557"/>
+            <a:ext cx="1284900" cy="543163"/>
+          </a:xfrm>
+          <a:prstGeom prst="roundRect">
+            <a:avLst/>
+          </a:prstGeom>
+        </p:spPr>
+        <p:style>
+          <a:lnRef idx="2">
+            <a:schemeClr val="accent6">
+              <a:shade val="50000"/>
+            </a:schemeClr>
+          </a:lnRef>
+          <a:fillRef idx="1">
+            <a:schemeClr val="accent6"/>
+          </a:fillRef>
+          <a:effectRef idx="0">
+            <a:schemeClr val="accent6"/>
+          </a:effectRef>
+          <a:fontRef idx="minor">
+            <a:schemeClr val="lt1"/>
+          </a:fontRef>
+        </p:style>
+        <p:txBody>
+          <a:bodyPr rtlCol="0" anchor="ctr"/>
+          <a:lstStyle/>
+          <a:p>
+            <a:pPr algn="ctr"/>
+            <a:r>
+              <a:rPr lang="it-IT" dirty="0" err="1" smtClean="0"/>
+              <a:t>Objective</a:t>
+            </a:r>
+            <a:r>
+              <a:rPr lang="it-IT" dirty="0" smtClean="0"/>
+              <a:t> </a:t>
+            </a:r>
+            <a:r>
+              <a:rPr lang="it-IT" dirty="0" err="1" smtClean="0"/>
+              <a:t>Property</a:t>
+            </a:r>
+            <a:endParaRPr lang="it-IT" dirty="0"/>
+          </a:p>
+        </p:txBody>
+      </p:sp>
+      <p:sp>
+        <p:nvSpPr>
+          <p:cNvPr id="140" name="Rounded Rectangle 139"/>
+          <p:cNvSpPr/>
+          <p:nvPr/>
+        </p:nvSpPr>
+        <p:spPr>
+          <a:xfrm>
+            <a:off x="6437835" y="908720"/>
+            <a:ext cx="1195791" cy="864096"/>
+          </a:xfrm>
+          <a:prstGeom prst="roundRect">
+            <a:avLst/>
+          </a:prstGeom>
+          <a:solidFill>
+            <a:srgbClr val="00863D"/>
+          </a:solidFill>
+          <a:ln>
+            <a:solidFill>
+              <a:srgbClr val="00863D"/>
+            </a:solidFill>
+          </a:ln>
+        </p:spPr>
+        <p:style>
+          <a:lnRef idx="2">
+            <a:schemeClr val="accent6">
+              <a:shade val="50000"/>
+            </a:schemeClr>
+          </a:lnRef>
+          <a:fillRef idx="1">
+            <a:schemeClr val="accent6"/>
+          </a:fillRef>
+          <a:effectRef idx="0">
+            <a:schemeClr val="accent6"/>
+          </a:effectRef>
+          <a:fontRef idx="minor">
+            <a:schemeClr val="lt1"/>
+          </a:fontRef>
+        </p:style>
+        <p:txBody>
+          <a:bodyPr rtlCol="0" anchor="ctr"/>
+          <a:lstStyle/>
+          <a:p>
+            <a:pPr algn="ctr"/>
+            <a:r>
+              <a:rPr lang="it-IT" dirty="0" smtClean="0"/>
+              <a:t>Expert </a:t>
+            </a:r>
+            <a:r>
+              <a:rPr lang="it-IT" dirty="0" err="1" smtClean="0"/>
+              <a:t>Objective</a:t>
+            </a:r>
+            <a:endParaRPr lang="it-IT" dirty="0" smtClean="0"/>
+          </a:p>
+          <a:p>
+            <a:pPr algn="ctr"/>
+            <a:r>
+              <a:rPr lang="it-IT" dirty="0" err="1" smtClean="0"/>
+              <a:t>Property</a:t>
+            </a:r>
+            <a:endParaRPr lang="it-IT" dirty="0"/>
+          </a:p>
+        </p:txBody>
+      </p:sp>
+      <p:sp>
+        <p:nvSpPr>
+          <p:cNvPr id="141" name="Rounded Rectangle 140"/>
+          <p:cNvSpPr/>
+          <p:nvPr/>
+        </p:nvSpPr>
+        <p:spPr>
+          <a:xfrm>
+            <a:off x="4412465" y="1207785"/>
+            <a:ext cx="1644626" cy="543163"/>
+          </a:xfrm>
+          <a:prstGeom prst="roundRect">
+            <a:avLst/>
+          </a:prstGeom>
+          <a:solidFill>
+            <a:srgbClr val="00B050"/>
+          </a:solidFill>
+          <a:ln>
+            <a:solidFill>
+              <a:srgbClr val="92D050"/>
+            </a:solidFill>
+          </a:ln>
+        </p:spPr>
+        <p:style>
+          <a:lnRef idx="2">
+            <a:schemeClr val="accent6">
+              <a:shade val="50000"/>
+            </a:schemeClr>
+          </a:lnRef>
+          <a:fillRef idx="1">
+            <a:schemeClr val="accent6"/>
+          </a:fillRef>
+          <a:effectRef idx="0">
+            <a:schemeClr val="accent6"/>
+          </a:effectRef>
+          <a:fontRef idx="minor">
+            <a:schemeClr val="lt1"/>
+          </a:fontRef>
+        </p:style>
+        <p:txBody>
+          <a:bodyPr rtlCol="0" anchor="ctr"/>
+          <a:lstStyle/>
+          <a:p>
+            <a:pPr algn="ctr"/>
+            <a:r>
+              <a:rPr lang="it-IT" dirty="0" err="1" smtClean="0"/>
+              <a:t>Organizational</a:t>
+            </a:r>
+            <a:endParaRPr lang="it-IT" dirty="0" smtClean="0"/>
+          </a:p>
+          <a:p>
+            <a:pPr algn="ctr"/>
+            <a:r>
+              <a:rPr lang="it-IT" dirty="0" err="1" smtClean="0"/>
+              <a:t>Detail</a:t>
+            </a:r>
+            <a:endParaRPr lang="it-IT" dirty="0" smtClean="0"/>
+          </a:p>
+        </p:txBody>
+      </p:sp>
+      <p:sp>
+        <p:nvSpPr>
+          <p:cNvPr id="142" name="Rounded Rectangle 141"/>
+          <p:cNvSpPr/>
+          <p:nvPr/>
+        </p:nvSpPr>
+        <p:spPr>
+          <a:xfrm>
+            <a:off x="7674145" y="3626345"/>
+            <a:ext cx="1434892" cy="543163"/>
+          </a:xfrm>
+          <a:prstGeom prst="roundRect">
+            <a:avLst/>
+          </a:prstGeom>
+          <a:solidFill>
+            <a:srgbClr val="00B050"/>
+          </a:solidFill>
+          <a:ln>
+            <a:solidFill>
+              <a:srgbClr val="92D050"/>
+            </a:solidFill>
+          </a:ln>
+        </p:spPr>
+        <p:style>
+          <a:lnRef idx="2">
+            <a:schemeClr val="accent6">
+              <a:shade val="50000"/>
+            </a:schemeClr>
+          </a:lnRef>
+          <a:fillRef idx="1">
+            <a:schemeClr val="accent6"/>
+          </a:fillRef>
+          <a:effectRef idx="0">
+            <a:schemeClr val="accent6"/>
+          </a:effectRef>
+          <a:fontRef idx="minor">
+            <a:schemeClr val="lt1"/>
+          </a:fontRef>
+        </p:style>
+        <p:txBody>
+          <a:bodyPr rtlCol="0" anchor="ctr"/>
+          <a:lstStyle/>
+          <a:p>
+            <a:pPr algn="ctr"/>
+            <a:r>
+              <a:rPr lang="it-IT" dirty="0" err="1" smtClean="0"/>
+              <a:t>Certification</a:t>
+            </a:r>
+            <a:endParaRPr lang="it-IT" dirty="0" smtClean="0"/>
+          </a:p>
+          <a:p>
+            <a:pPr algn="ctr"/>
+            <a:r>
+              <a:rPr lang="it-IT" dirty="0" err="1" smtClean="0"/>
+              <a:t>Detail</a:t>
+            </a:r>
+            <a:endParaRPr lang="it-IT" dirty="0" smtClean="0"/>
+          </a:p>
+        </p:txBody>
+      </p:sp>
+      <p:sp>
+        <p:nvSpPr>
+          <p:cNvPr id="144" name="Rounded Rectangle 143"/>
+          <p:cNvSpPr/>
+          <p:nvPr/>
+        </p:nvSpPr>
+        <p:spPr>
+          <a:xfrm>
+            <a:off x="7667121" y="5479874"/>
+            <a:ext cx="1434892" cy="543163"/>
+          </a:xfrm>
+          <a:prstGeom prst="roundRect">
+            <a:avLst/>
+          </a:prstGeom>
+          <a:solidFill>
+            <a:srgbClr val="00B050"/>
+          </a:solidFill>
+          <a:ln>
+            <a:solidFill>
+              <a:srgbClr val="92D050"/>
+            </a:solidFill>
+          </a:ln>
+        </p:spPr>
+        <p:style>
+          <a:lnRef idx="2">
+            <a:schemeClr val="accent6">
+              <a:shade val="50000"/>
+            </a:schemeClr>
+          </a:lnRef>
+          <a:fillRef idx="1">
+            <a:schemeClr val="accent6"/>
+          </a:fillRef>
+          <a:effectRef idx="0">
+            <a:schemeClr val="accent6"/>
+          </a:effectRef>
+          <a:fontRef idx="minor">
+            <a:schemeClr val="lt1"/>
+          </a:fontRef>
+        </p:style>
+        <p:txBody>
+          <a:bodyPr rtlCol="0" anchor="ctr"/>
+          <a:lstStyle/>
+          <a:p>
+            <a:pPr algn="ctr"/>
+            <a:r>
+              <a:rPr lang="it-IT" dirty="0" err="1" smtClean="0"/>
+              <a:t>Contractual</a:t>
+            </a:r>
+            <a:endParaRPr lang="it-IT" dirty="0" smtClean="0"/>
+          </a:p>
+          <a:p>
+            <a:pPr algn="ctr"/>
+            <a:r>
+              <a:rPr lang="it-IT" dirty="0" err="1" smtClean="0"/>
+              <a:t>Detail</a:t>
+            </a:r>
+            <a:endParaRPr lang="it-IT" dirty="0" smtClean="0"/>
+          </a:p>
+        </p:txBody>
+      </p:sp>
+      <p:sp>
+        <p:nvSpPr>
+          <p:cNvPr id="146" name="Rounded Rectangle 145"/>
+          <p:cNvSpPr/>
+          <p:nvPr/>
+        </p:nvSpPr>
+        <p:spPr>
+          <a:xfrm>
+            <a:off x="8030439" y="936203"/>
+            <a:ext cx="1059299" cy="543163"/>
+          </a:xfrm>
+          <a:prstGeom prst="roundRect">
+            <a:avLst/>
+          </a:prstGeom>
+          <a:solidFill>
+            <a:srgbClr val="00B050"/>
+          </a:solidFill>
+          <a:ln>
+            <a:solidFill>
+              <a:srgbClr val="92D050"/>
+            </a:solidFill>
+          </a:ln>
+        </p:spPr>
+        <p:style>
+          <a:lnRef idx="2">
+            <a:schemeClr val="accent6">
+              <a:shade val="50000"/>
+            </a:schemeClr>
+          </a:lnRef>
+          <a:fillRef idx="1">
+            <a:schemeClr val="accent6"/>
+          </a:fillRef>
+          <a:effectRef idx="0">
+            <a:schemeClr val="accent6"/>
+          </a:effectRef>
+          <a:fontRef idx="minor">
+            <a:schemeClr val="lt1"/>
+          </a:fontRef>
+        </p:style>
+        <p:txBody>
+          <a:bodyPr rtlCol="0" anchor="ctr"/>
+          <a:lstStyle/>
+          <a:p>
+            <a:pPr algn="ctr"/>
+            <a:r>
+              <a:rPr lang="it-IT" dirty="0" smtClean="0"/>
+              <a:t>Personal</a:t>
+            </a:r>
+          </a:p>
+          <a:p>
+            <a:pPr algn="ctr"/>
+            <a:r>
+              <a:rPr lang="it-IT" dirty="0" err="1" smtClean="0"/>
+              <a:t>Detail</a:t>
+            </a:r>
+            <a:endParaRPr lang="it-IT" dirty="0" smtClean="0"/>
+          </a:p>
+        </p:txBody>
+      </p:sp>
+      <p:sp>
+        <p:nvSpPr>
+          <p:cNvPr id="147" name="Rounded Rectangle 146"/>
+          <p:cNvSpPr/>
+          <p:nvPr/>
+        </p:nvSpPr>
+        <p:spPr>
+          <a:xfrm>
+            <a:off x="7668344" y="2179717"/>
+            <a:ext cx="1402870" cy="543163"/>
+          </a:xfrm>
+          <a:prstGeom prst="roundRect">
+            <a:avLst/>
+          </a:prstGeom>
+          <a:solidFill>
+            <a:srgbClr val="00B050"/>
+          </a:solidFill>
+          <a:ln>
+            <a:solidFill>
+              <a:srgbClr val="92D050"/>
+            </a:solidFill>
+          </a:ln>
+        </p:spPr>
+        <p:style>
+          <a:lnRef idx="2">
+            <a:schemeClr val="accent6">
+              <a:shade val="50000"/>
+            </a:schemeClr>
+          </a:lnRef>
+          <a:fillRef idx="1">
+            <a:schemeClr val="accent6"/>
+          </a:fillRef>
+          <a:effectRef idx="0">
+            <a:schemeClr val="accent6"/>
+          </a:effectRef>
+          <a:fontRef idx="minor">
+            <a:schemeClr val="lt1"/>
+          </a:fontRef>
+        </p:style>
+        <p:txBody>
+          <a:bodyPr rtlCol="0" anchor="ctr"/>
+          <a:lstStyle/>
+          <a:p>
+            <a:pPr algn="ctr"/>
+            <a:r>
+              <a:rPr lang="it-IT" dirty="0" smtClean="0"/>
+              <a:t>Professional</a:t>
+            </a:r>
+          </a:p>
+          <a:p>
+            <a:pPr algn="ctr"/>
+            <a:r>
+              <a:rPr lang="it-IT" dirty="0" err="1" smtClean="0"/>
+              <a:t>Detail</a:t>
+            </a:r>
+            <a:endParaRPr lang="it-IT" dirty="0" smtClean="0"/>
+          </a:p>
+        </p:txBody>
+      </p:sp>
+      <p:cxnSp>
+        <p:nvCxnSpPr>
+          <p:cNvPr id="148" name="Straight Arrow Connector 147"/>
+          <p:cNvCxnSpPr>
+            <a:stCxn id="140" idx="0"/>
+            <a:endCxn id="134" idx="2"/>
+          </p:cNvCxnSpPr>
+          <p:nvPr/>
+        </p:nvCxnSpPr>
+        <p:spPr>
+          <a:xfrm flipH="1" flipV="1">
+            <a:off x="7035207" y="598720"/>
+            <a:ext cx="524" cy="310000"/>
+          </a:xfrm>
+          <a:prstGeom prst="straightConnector1">
+            <a:avLst/>
+          </a:prstGeom>
+          <a:ln>
+            <a:tailEnd type="arrow"/>
+          </a:ln>
+        </p:spPr>
+        <p:style>
+          <a:lnRef idx="2">
+            <a:schemeClr val="accent1"/>
+          </a:lnRef>
+          <a:fillRef idx="0">
+            <a:schemeClr val="accent1"/>
+          </a:fillRef>
+          <a:effectRef idx="1">
+            <a:schemeClr val="accent1"/>
+          </a:effectRef>
+          <a:fontRef idx="minor">
+            <a:schemeClr val="tx1"/>
+          </a:fontRef>
+        </p:style>
+      </p:cxnSp>
+      <p:cxnSp>
+        <p:nvCxnSpPr>
+          <p:cNvPr id="150" name="Straight Arrow Connector 149"/>
+          <p:cNvCxnSpPr>
+            <a:stCxn id="91" idx="0"/>
+            <a:endCxn id="147" idx="2"/>
+          </p:cNvCxnSpPr>
+          <p:nvPr/>
+        </p:nvCxnSpPr>
+        <p:spPr>
+          <a:xfrm flipV="1">
+            <a:off x="6230366" y="2722880"/>
+            <a:ext cx="2139413" cy="640017"/>
+          </a:xfrm>
+          <a:prstGeom prst="straightConnector1">
+            <a:avLst/>
+          </a:prstGeom>
+          <a:ln>
+            <a:tailEnd type="arrow"/>
+          </a:ln>
+        </p:spPr>
+        <p:style>
+          <a:lnRef idx="2">
+            <a:schemeClr val="accent1"/>
+          </a:lnRef>
+          <a:fillRef idx="0">
+            <a:schemeClr val="accent1"/>
+          </a:fillRef>
+          <a:effectRef idx="1">
+            <a:schemeClr val="accent1"/>
+          </a:effectRef>
+          <a:fontRef idx="minor">
+            <a:schemeClr val="tx1"/>
+          </a:fontRef>
+        </p:style>
+      </p:cxnSp>
+      <p:cxnSp>
+        <p:nvCxnSpPr>
+          <p:cNvPr id="151" name="Straight Arrow Connector 150"/>
+          <p:cNvCxnSpPr>
+            <a:stCxn id="122" idx="0"/>
+            <a:endCxn id="142" idx="1"/>
+          </p:cNvCxnSpPr>
+          <p:nvPr/>
+        </p:nvCxnSpPr>
+        <p:spPr>
+          <a:xfrm flipV="1">
+            <a:off x="6833878" y="3897927"/>
+            <a:ext cx="840267" cy="432527"/>
+          </a:xfrm>
+          <a:prstGeom prst="straightConnector1">
+            <a:avLst/>
+          </a:prstGeom>
+          <a:ln>
+            <a:tailEnd type="arrow"/>
+          </a:ln>
+        </p:spPr>
+        <p:style>
+          <a:lnRef idx="2">
+            <a:schemeClr val="accent1"/>
+          </a:lnRef>
+          <a:fillRef idx="0">
+            <a:schemeClr val="accent1"/>
+          </a:fillRef>
+          <a:effectRef idx="1">
+            <a:schemeClr val="accent1"/>
+          </a:effectRef>
+          <a:fontRef idx="minor">
+            <a:schemeClr val="tx1"/>
+          </a:fontRef>
+        </p:style>
+      </p:cxnSp>
+      <p:cxnSp>
+        <p:nvCxnSpPr>
+          <p:cNvPr id="152" name="Straight Arrow Connector 151"/>
+          <p:cNvCxnSpPr>
+            <a:stCxn id="75" idx="3"/>
+            <a:endCxn id="144" idx="1"/>
+          </p:cNvCxnSpPr>
+          <p:nvPr/>
+        </p:nvCxnSpPr>
+        <p:spPr>
+          <a:xfrm>
+            <a:off x="4645294" y="5282529"/>
+            <a:ext cx="3021827" cy="468927"/>
+          </a:xfrm>
+          <a:prstGeom prst="straightConnector1">
+            <a:avLst/>
+          </a:prstGeom>
+          <a:ln>
+            <a:tailEnd type="arrow"/>
+          </a:ln>
+        </p:spPr>
+        <p:style>
+          <a:lnRef idx="2">
+            <a:schemeClr val="accent1"/>
+          </a:lnRef>
+          <a:fillRef idx="0">
+            <a:schemeClr val="accent1"/>
+          </a:fillRef>
+          <a:effectRef idx="1">
+            <a:schemeClr val="accent1"/>
+          </a:effectRef>
+          <a:fontRef idx="minor">
+            <a:schemeClr val="tx1"/>
+          </a:fontRef>
+        </p:style>
+      </p:cxnSp>
+      <p:cxnSp>
+        <p:nvCxnSpPr>
+          <p:cNvPr id="153" name="Straight Arrow Connector 152"/>
+          <p:cNvCxnSpPr>
+            <a:stCxn id="141" idx="3"/>
+            <a:endCxn id="140" idx="1"/>
+          </p:cNvCxnSpPr>
+          <p:nvPr/>
+        </p:nvCxnSpPr>
+        <p:spPr>
+          <a:xfrm flipV="1">
+            <a:off x="6057091" y="1340768"/>
+            <a:ext cx="380744" cy="138599"/>
+          </a:xfrm>
+          <a:prstGeom prst="straightConnector1">
+            <a:avLst/>
+          </a:prstGeom>
+          <a:ln>
+            <a:tailEnd type="arrow"/>
+          </a:ln>
+        </p:spPr>
+        <p:style>
+          <a:lnRef idx="2">
+            <a:schemeClr val="accent1"/>
+          </a:lnRef>
+          <a:fillRef idx="0">
+            <a:schemeClr val="accent1"/>
+          </a:fillRef>
+          <a:effectRef idx="1">
+            <a:schemeClr val="accent1"/>
+          </a:effectRef>
+          <a:fontRef idx="minor">
+            <a:schemeClr val="tx1"/>
+          </a:fontRef>
+        </p:style>
+      </p:cxnSp>
+      <p:cxnSp>
+        <p:nvCxnSpPr>
+          <p:cNvPr id="154" name="Straight Arrow Connector 153"/>
+          <p:cNvCxnSpPr>
+            <a:stCxn id="146" idx="1"/>
+            <a:endCxn id="140" idx="3"/>
+          </p:cNvCxnSpPr>
+          <p:nvPr/>
+        </p:nvCxnSpPr>
+        <p:spPr>
+          <a:xfrm flipH="1">
+            <a:off x="7633626" y="1207785"/>
+            <a:ext cx="396813" cy="132983"/>
+          </a:xfrm>
+          <a:prstGeom prst="straightConnector1">
+            <a:avLst/>
+          </a:prstGeom>
+          <a:ln>
+            <a:tailEnd type="arrow"/>
+          </a:ln>
+        </p:spPr>
+        <p:style>
+          <a:lnRef idx="2">
+            <a:schemeClr val="accent1"/>
+          </a:lnRef>
+          <a:fillRef idx="0">
+            <a:schemeClr val="accent1"/>
+          </a:fillRef>
+          <a:effectRef idx="1">
+            <a:schemeClr val="accent1"/>
+          </a:effectRef>
+          <a:fontRef idx="minor">
+            <a:schemeClr val="tx1"/>
+          </a:fontRef>
+        </p:style>
+      </p:cxnSp>
+      <p:cxnSp>
+        <p:nvCxnSpPr>
+          <p:cNvPr id="156" name="Straight Arrow Connector 155"/>
+          <p:cNvCxnSpPr>
+            <a:stCxn id="147" idx="0"/>
+            <a:endCxn id="140" idx="2"/>
+          </p:cNvCxnSpPr>
+          <p:nvPr/>
+        </p:nvCxnSpPr>
+        <p:spPr>
+          <a:xfrm flipH="1" flipV="1">
+            <a:off x="7035731" y="1772816"/>
+            <a:ext cx="1334048" cy="406901"/>
+          </a:xfrm>
+          <a:prstGeom prst="straightConnector1">
+            <a:avLst/>
+          </a:prstGeom>
+          <a:ln>
+            <a:tailEnd type="arrow"/>
+          </a:ln>
+        </p:spPr>
+        <p:style>
+          <a:lnRef idx="2">
+            <a:schemeClr val="accent1"/>
+          </a:lnRef>
+          <a:fillRef idx="0">
+            <a:schemeClr val="accent1"/>
+          </a:fillRef>
+          <a:effectRef idx="1">
+            <a:schemeClr val="accent1"/>
+          </a:effectRef>
+          <a:fontRef idx="minor">
+            <a:schemeClr val="tx1"/>
+          </a:fontRef>
+        </p:style>
+      </p:cxnSp>
+      <p:cxnSp>
+        <p:nvCxnSpPr>
+          <p:cNvPr id="157" name="Straight Arrow Connector 156"/>
+          <p:cNvCxnSpPr>
+            <a:stCxn id="142" idx="0"/>
+            <a:endCxn id="140" idx="2"/>
+          </p:cNvCxnSpPr>
+          <p:nvPr/>
+        </p:nvCxnSpPr>
+        <p:spPr>
+          <a:xfrm flipH="1" flipV="1">
+            <a:off x="7035731" y="1772816"/>
+            <a:ext cx="1355860" cy="1853529"/>
+          </a:xfrm>
+          <a:prstGeom prst="straightConnector1">
+            <a:avLst/>
+          </a:prstGeom>
+          <a:ln>
+            <a:tailEnd type="arrow"/>
+          </a:ln>
+        </p:spPr>
+        <p:style>
+          <a:lnRef idx="2">
+            <a:schemeClr val="accent1"/>
+          </a:lnRef>
+          <a:fillRef idx="0">
+            <a:schemeClr val="accent1"/>
+          </a:fillRef>
+          <a:effectRef idx="1">
+            <a:schemeClr val="accent1"/>
+          </a:effectRef>
+          <a:fontRef idx="minor">
+            <a:schemeClr val="tx1"/>
+          </a:fontRef>
+        </p:style>
+      </p:cxnSp>
+      <p:cxnSp>
+        <p:nvCxnSpPr>
+          <p:cNvPr id="158" name="Straight Arrow Connector 157"/>
+          <p:cNvCxnSpPr>
+            <a:stCxn id="144" idx="0"/>
+            <a:endCxn id="140" idx="2"/>
+          </p:cNvCxnSpPr>
+          <p:nvPr/>
+        </p:nvCxnSpPr>
+        <p:spPr>
+          <a:xfrm flipH="1" flipV="1">
+            <a:off x="7035731" y="1772816"/>
+            <a:ext cx="1348836" cy="3707058"/>
+          </a:xfrm>
+          <a:prstGeom prst="straightConnector1">
+            <a:avLst/>
+          </a:prstGeom>
+          <a:ln>
+            <a:tailEnd type="arrow"/>
+          </a:ln>
+        </p:spPr>
+        <p:style>
+          <a:lnRef idx="2">
+            <a:schemeClr val="accent1"/>
+          </a:lnRef>
+          <a:fillRef idx="0">
+            <a:schemeClr val="accent1"/>
+          </a:fillRef>
+          <a:effectRef idx="1">
+            <a:schemeClr val="accent1"/>
+          </a:effectRef>
+          <a:fontRef idx="minor">
+            <a:schemeClr val="tx1"/>
+          </a:fontRef>
+        </p:style>
+      </p:cxnSp>
+      <p:sp>
+        <p:nvSpPr>
+          <p:cNvPr id="180" name="Rounded Rectangle 179"/>
+          <p:cNvSpPr/>
+          <p:nvPr/>
+        </p:nvSpPr>
+        <p:spPr>
+          <a:xfrm>
+            <a:off x="2953106" y="476672"/>
+            <a:ext cx="1259415" cy="864096"/>
+          </a:xfrm>
+          <a:prstGeom prst="roundRect">
+            <a:avLst/>
+          </a:prstGeom>
+          <a:solidFill>
+            <a:srgbClr val="00863D"/>
+          </a:solidFill>
+          <a:ln>
+            <a:solidFill>
+              <a:srgbClr val="00863D"/>
+            </a:solidFill>
+          </a:ln>
+        </p:spPr>
+        <p:style>
+          <a:lnRef idx="2">
+            <a:schemeClr val="accent6">
+              <a:shade val="50000"/>
+            </a:schemeClr>
+          </a:lnRef>
+          <a:fillRef idx="1">
+            <a:schemeClr val="accent6"/>
+          </a:fillRef>
+          <a:effectRef idx="0">
+            <a:schemeClr val="accent6"/>
+          </a:effectRef>
+          <a:fontRef idx="minor">
+            <a:schemeClr val="lt1"/>
+          </a:fontRef>
+        </p:style>
+        <p:txBody>
+          <a:bodyPr rtlCol="0" anchor="ctr"/>
+          <a:lstStyle/>
+          <a:p>
+            <a:pPr algn="ctr"/>
+            <a:r>
+              <a:rPr lang="it-IT" dirty="0" smtClean="0"/>
+              <a:t>Expert </a:t>
+            </a:r>
+            <a:r>
+              <a:rPr lang="it-IT" dirty="0" err="1" smtClean="0"/>
+              <a:t>Subjective</a:t>
+            </a:r>
+            <a:endParaRPr lang="it-IT" dirty="0" smtClean="0"/>
+          </a:p>
+          <a:p>
+            <a:pPr algn="ctr"/>
+            <a:r>
+              <a:rPr lang="it-IT" dirty="0" err="1" smtClean="0"/>
+              <a:t>Property</a:t>
+            </a:r>
+            <a:endParaRPr lang="it-IT" dirty="0"/>
+          </a:p>
+        </p:txBody>
+      </p:sp>
+      <p:cxnSp>
+        <p:nvCxnSpPr>
+          <p:cNvPr id="188" name="Straight Arrow Connector 187"/>
+          <p:cNvCxnSpPr>
+            <a:stCxn id="104" idx="0"/>
+            <a:endCxn id="180" idx="2"/>
+          </p:cNvCxnSpPr>
+          <p:nvPr/>
+        </p:nvCxnSpPr>
+        <p:spPr>
+          <a:xfrm flipV="1">
+            <a:off x="3529171" y="1340768"/>
+            <a:ext cx="53643" cy="212835"/>
+          </a:xfrm>
+          <a:prstGeom prst="straightConnector1">
+            <a:avLst/>
+          </a:prstGeom>
+          <a:ln>
+            <a:tailEnd type="arrow"/>
+          </a:ln>
+        </p:spPr>
+        <p:style>
+          <a:lnRef idx="2">
+            <a:schemeClr val="accent1"/>
+          </a:lnRef>
+          <a:fillRef idx="0">
+            <a:schemeClr val="accent1"/>
+          </a:fillRef>
+          <a:effectRef idx="1">
+            <a:schemeClr val="accent1"/>
+          </a:effectRef>
+          <a:fontRef idx="minor">
+            <a:schemeClr val="tx1"/>
+          </a:fontRef>
+        </p:style>
+      </p:cxnSp>
+      <p:cxnSp>
+        <p:nvCxnSpPr>
+          <p:cNvPr id="241" name="Straight Arrow Connector 240"/>
+          <p:cNvCxnSpPr>
+            <a:stCxn id="42" idx="0"/>
+            <a:endCxn id="141" idx="2"/>
+          </p:cNvCxnSpPr>
+          <p:nvPr/>
+        </p:nvCxnSpPr>
+        <p:spPr>
+          <a:xfrm flipH="1" flipV="1">
+            <a:off x="5234778" y="1750948"/>
+            <a:ext cx="886680" cy="514739"/>
+          </a:xfrm>
+          <a:prstGeom prst="straightConnector1">
+            <a:avLst/>
+          </a:prstGeom>
+          <a:ln>
+            <a:tailEnd type="arrow"/>
+          </a:ln>
+        </p:spPr>
+        <p:style>
+          <a:lnRef idx="2">
+            <a:schemeClr val="accent1"/>
+          </a:lnRef>
+          <a:fillRef idx="0">
+            <a:schemeClr val="accent1"/>
+          </a:fillRef>
+          <a:effectRef idx="1">
+            <a:schemeClr val="accent1"/>
+          </a:effectRef>
+          <a:fontRef idx="minor">
+            <a:schemeClr val="tx1"/>
+          </a:fontRef>
+        </p:style>
+      </p:cxnSp>
+      <p:sp>
+        <p:nvSpPr>
+          <p:cNvPr id="160" name="TextBox 159"/>
+          <p:cNvSpPr txBox="1"/>
+          <p:nvPr/>
+        </p:nvSpPr>
+        <p:spPr>
+          <a:xfrm>
+            <a:off x="1152906" y="5744289"/>
+            <a:ext cx="1160724" cy="276999"/>
+          </a:xfrm>
+          <a:prstGeom prst="rect">
+            <a:avLst/>
+          </a:prstGeom>
+          <a:noFill/>
+        </p:spPr>
+        <p:txBody>
+          <a:bodyPr wrap="square" rtlCol="0">
+            <a:spAutoFit/>
+          </a:bodyPr>
+          <a:lstStyle/>
+          <a:p>
+            <a:r>
+              <a:rPr lang="it-IT" sz="1200" dirty="0" err="1" smtClean="0"/>
+              <a:t>isRelatedTo</a:t>
+            </a:r>
+            <a:endParaRPr lang="it-IT" sz="1200" dirty="0"/>
+          </a:p>
+        </p:txBody>
+      </p:sp>
+    </p:spTree>
+    <p:extLst>
+      <p:ext uri="{BB962C8B-B14F-4D97-AF65-F5344CB8AC3E}">
+        <p14:creationId xmlns:p14="http://schemas.microsoft.com/office/powerpoint/2010/main" val="85573856"/>
+      </p:ext>
+    </p:extLst>
+  </p:cSld>
+  <p:clrMapOvr>
+    <a:masterClrMapping/>
+  </p:clrMapOvr>
+  <p:timing>
+    <p:tnLst>
+      <p:par>
+        <p:cTn id="1" dur="indefinite" restart="never" nodeType="tmRoot"/>
+      </p:par>
+    </p:tnLst>
+  </p:timing>
 </p:sld>
 </file>
 

</xml_diff>